<commit_message>
Ejercicios vistos en la sesion de repaso y estructuras
</commit_message>
<xml_diff>
--- a/presentaciones/Programacion avanzada - 01 clase de repaso.pptx
+++ b/presentaciones/Programacion avanzada - 01 clase de repaso.pptx
@@ -2255,7 +2255,7 @@
         </p:nvSpPr>
         <p:spPr>
           <a:xfrm>
-            <a:off x="381300" y="685800"/>
+            <a:off x="381000" y="685800"/>
             <a:ext cx="6096000" cy="3429000"/>
           </a:xfrm>
           <a:custGeom>
@@ -6103,7 +6103,7 @@
         </p:nvSpPr>
         <p:spPr>
           <a:xfrm>
-            <a:off x="381300" y="685800"/>
+            <a:off x="381000" y="685800"/>
             <a:ext cx="6096000" cy="3429000"/>
           </a:xfrm>
           <a:custGeom>
@@ -6519,7 +6519,7 @@
         </p:nvSpPr>
         <p:spPr>
           <a:xfrm>
-            <a:off x="381300" y="685800"/>
+            <a:off x="381000" y="685800"/>
             <a:ext cx="6096000" cy="3429000"/>
           </a:xfrm>
           <a:custGeom>
@@ -12483,10 +12483,10 @@
               <a:buChar char="●"/>
             </a:pPr>
             <a:r>
-              <a:rPr lang="es-419"/>
+              <a:rPr lang="es-419" dirty="0"/>
               <a:t>Tipos de datos nativos</a:t>
             </a:r>
-            <a:endParaRPr/>
+            <a:endParaRPr dirty="0"/>
           </a:p>
           <a:p>
             <a:pPr marL="0" lvl="0" indent="0" algn="l" rtl="0">
@@ -12498,7 +12498,7 @@
               </a:spcAft>
               <a:buNone/>
             </a:pPr>
-            <a:endParaRPr/>
+            <a:endParaRPr dirty="0"/>
           </a:p>
         </p:txBody>
       </p:sp>
@@ -12604,10 +12604,10 @@
                         <a:buNone/>
                       </a:pPr>
                       <a:r>
-                        <a:rPr lang="es-419"/>
+                        <a:rPr lang="es-419" dirty="0" err="1"/>
                         <a:t>char</a:t>
                       </a:r>
-                      <a:endParaRPr/>
+                      <a:endParaRPr dirty="0"/>
                     </a:p>
                   </a:txBody>
                   <a:tcPr marL="91425" marR="91425" marT="91425" marB="91425"/>
@@ -12657,10 +12657,10 @@
                         <a:buNone/>
                       </a:pPr>
                       <a:r>
-                        <a:rPr lang="es-419"/>
+                        <a:rPr lang="es-419" dirty="0"/>
                         <a:t>short</a:t>
                       </a:r>
-                      <a:endParaRPr/>
+                      <a:endParaRPr dirty="0"/>
                     </a:p>
                   </a:txBody>
                   <a:tcPr marL="91425" marR="91425" marT="91425" marB="91425"/>
@@ -12710,10 +12710,10 @@
                         <a:buNone/>
                       </a:pPr>
                       <a:r>
-                        <a:rPr lang="es-419"/>
+                        <a:rPr lang="es-419" dirty="0" err="1"/>
                         <a:t>int</a:t>
                       </a:r>
-                      <a:endParaRPr/>
+                      <a:endParaRPr dirty="0"/>
                     </a:p>
                   </a:txBody>
                   <a:tcPr marL="91425" marR="91425" marT="91425" marB="91425"/>
@@ -12763,10 +12763,18 @@
                         <a:buNone/>
                       </a:pPr>
                       <a:r>
-                        <a:rPr lang="es-419"/>
-                        <a:t>unsigned int</a:t>
+                        <a:rPr lang="es-419" dirty="0" err="1"/>
+                        <a:t>unsigned</a:t>
                       </a:r>
-                      <a:endParaRPr/>
+                      <a:r>
+                        <a:rPr lang="es-419" dirty="0"/>
+                        <a:t> </a:t>
+                      </a:r>
+                      <a:r>
+                        <a:rPr lang="es-419" dirty="0" err="1"/>
+                        <a:t>int</a:t>
+                      </a:r>
+                      <a:endParaRPr dirty="0"/>
                     </a:p>
                   </a:txBody>
                   <a:tcPr marL="91425" marR="91425" marT="91425" marB="91425"/>
@@ -12816,10 +12824,10 @@
                         <a:buNone/>
                       </a:pPr>
                       <a:r>
-                        <a:rPr lang="es-419"/>
+                        <a:rPr lang="es-419" dirty="0" err="1"/>
                         <a:t>long</a:t>
                       </a:r>
-                      <a:endParaRPr/>
+                      <a:endParaRPr dirty="0"/>
                     </a:p>
                   </a:txBody>
                   <a:tcPr marL="91425" marR="91425" marT="91425" marB="91425"/>
@@ -12869,10 +12877,10 @@
                         <a:buNone/>
                       </a:pPr>
                       <a:r>
-                        <a:rPr lang="es-419"/>
+                        <a:rPr lang="es-419" dirty="0" err="1"/>
                         <a:t>float</a:t>
                       </a:r>
-                      <a:endParaRPr/>
+                      <a:endParaRPr dirty="0"/>
                     </a:p>
                   </a:txBody>
                   <a:tcPr marL="91425" marR="91425" marT="91425" marB="91425"/>
@@ -12922,10 +12930,10 @@
                         <a:buNone/>
                       </a:pPr>
                       <a:r>
-                        <a:rPr lang="es-419"/>
+                        <a:rPr lang="es-419" dirty="0" err="1"/>
                         <a:t>double</a:t>
                       </a:r>
-                      <a:endParaRPr/>
+                      <a:endParaRPr dirty="0"/>
                     </a:p>
                   </a:txBody>
                   <a:tcPr marL="91425" marR="91425" marT="91425" marB="91425"/>
@@ -12945,10 +12953,10 @@
                         <a:buNone/>
                       </a:pPr>
                       <a:r>
-                        <a:rPr lang="es-419"/>
+                        <a:rPr lang="es-419" dirty="0"/>
                         <a:t>0.00045</a:t>
                       </a:r>
-                      <a:endParaRPr/>
+                      <a:endParaRPr dirty="0"/>
                     </a:p>
                   </a:txBody>
                   <a:tcPr marL="91425" marR="91425" marT="91425" marB="91425"/>
@@ -13066,18 +13074,22 @@
               <a:buChar char="●"/>
             </a:pPr>
             <a:r>
-              <a:rPr lang="es-419"/>
+              <a:rPr lang="es-419" dirty="0"/>
               <a:t>Enumeraciones: Las enumeraciones (</a:t>
             </a:r>
             <a:r>
-              <a:rPr lang="es-419" i="1"/>
-              <a:t>enum) </a:t>
-            </a:r>
-            <a:r>
-              <a:rPr lang="es-419"/>
+              <a:rPr lang="es-419" i="1" dirty="0" err="1"/>
+              <a:t>enum</a:t>
+            </a:r>
+            <a:r>
+              <a:rPr lang="es-419" i="1" dirty="0"/>
+              <a:t>) </a:t>
+            </a:r>
+            <a:r>
+              <a:rPr lang="es-419" dirty="0"/>
               <a:t>son un tipo de dato definido por el programador con constantes simbólicas tipo entero.</a:t>
             </a:r>
-            <a:endParaRPr/>
+            <a:endParaRPr dirty="0"/>
           </a:p>
           <a:p>
             <a:pPr marL="457200" lvl="0" indent="-342900" algn="l" rtl="0">
@@ -13091,10 +13103,18 @@
               <a:buChar char="●"/>
             </a:pPr>
             <a:r>
-              <a:rPr lang="es-419"/>
-              <a:t>La sintaxis para declarar un enum es la siguiente:</a:t>
-            </a:r>
-            <a:endParaRPr/>
+              <a:rPr lang="es-419" dirty="0"/>
+              <a:t>La sintaxis para declarar un </a:t>
+            </a:r>
+            <a:r>
+              <a:rPr lang="es-419" dirty="0" err="1"/>
+              <a:t>enum</a:t>
+            </a:r>
+            <a:r>
+              <a:rPr lang="es-419" dirty="0"/>
+              <a:t> es la siguiente:</a:t>
+            </a:r>
+            <a:endParaRPr dirty="0"/>
           </a:p>
           <a:p>
             <a:pPr marL="914400" lvl="0" indent="0" algn="l" rtl="0">
@@ -13107,10 +13127,14 @@
               <a:buNone/>
             </a:pPr>
             <a:r>
-              <a:rPr lang="es-419"/>
-              <a:t>enum nombre {</a:t>
-            </a:r>
-            <a:endParaRPr/>
+              <a:rPr lang="es-419" dirty="0" err="1"/>
+              <a:t>enum</a:t>
+            </a:r>
+            <a:r>
+              <a:rPr lang="es-419" dirty="0"/>
+              <a:t> nombre {</a:t>
+            </a:r>
+            <a:endParaRPr dirty="0"/>
           </a:p>
           <a:p>
             <a:pPr marL="914400" lvl="0" indent="0" algn="l" rtl="0">
@@ -13123,10 +13147,14 @@
               <a:buNone/>
             </a:pPr>
             <a:r>
-              <a:rPr lang="es-419"/>
-              <a:t>	enumerador1, enumerador2….enumerador_n</a:t>
-            </a:r>
-            <a:endParaRPr/>
+              <a:rPr lang="es-419" dirty="0"/>
+              <a:t>	enumerador1, enumerador2….</a:t>
+            </a:r>
+            <a:r>
+              <a:rPr lang="es-419" dirty="0" err="1"/>
+              <a:t>enumerador_n</a:t>
+            </a:r>
+            <a:endParaRPr dirty="0"/>
           </a:p>
           <a:p>
             <a:pPr marL="914400" lvl="0" indent="0" algn="l" rtl="0">
@@ -13139,10 +13167,10 @@
               <a:buNone/>
             </a:pPr>
             <a:r>
-              <a:rPr lang="es-419"/>
+              <a:rPr lang="es-419" dirty="0"/>
               <a:t>};</a:t>
             </a:r>
-            <a:endParaRPr/>
+            <a:endParaRPr dirty="0"/>
           </a:p>
           <a:p>
             <a:pPr marL="457200" lvl="0" indent="-342900" algn="l" rtl="0">
@@ -13156,10 +13184,10 @@
               <a:buChar char="●"/>
             </a:pPr>
             <a:r>
-              <a:rPr lang="es-419"/>
+              <a:rPr lang="es-419" dirty="0"/>
               <a:t>Por ejemplo:</a:t>
             </a:r>
-            <a:endParaRPr/>
+            <a:endParaRPr dirty="0"/>
           </a:p>
           <a:p>
             <a:pPr marL="914400" lvl="1" indent="-317500" algn="l" rtl="0">
@@ -13173,10 +13201,22 @@
               <a:buChar char="○"/>
             </a:pPr>
             <a:r>
-              <a:rPr lang="es-419"/>
-              <a:t>enum dias_semana{ LUNES, MARTES, MIERCOLES, JUEVES, VIERNES };</a:t>
-            </a:r>
-            <a:endParaRPr/>
+              <a:rPr lang="es-419" dirty="0" err="1"/>
+              <a:t>enum</a:t>
+            </a:r>
+            <a:r>
+              <a:rPr lang="es-419" dirty="0"/>
+              <a:t> </a:t>
+            </a:r>
+            <a:r>
+              <a:rPr lang="es-419" dirty="0" err="1"/>
+              <a:t>dias_semana</a:t>
+            </a:r>
+            <a:r>
+              <a:rPr lang="es-419" dirty="0"/>
+              <a:t>{ LUNES, MARTES, MIERCOLES, JUEVES, VIERNES };</a:t>
+            </a:r>
+            <a:endParaRPr dirty="0"/>
           </a:p>
           <a:p>
             <a:pPr marL="914400" lvl="1" indent="-317500" algn="l" rtl="0">
@@ -13190,10 +13230,14 @@
               <a:buChar char="○"/>
             </a:pPr>
             <a:r>
-              <a:rPr lang="es-419"/>
-              <a:t>enum roles { ADMINISTRADOR, VENDEDOR, REPARTIDOR, CLIENTE };</a:t>
-            </a:r>
-            <a:endParaRPr/>
+              <a:rPr lang="es-419" dirty="0" err="1"/>
+              <a:t>enum</a:t>
+            </a:r>
+            <a:r>
+              <a:rPr lang="es-419" dirty="0"/>
+              <a:t> roles { ADMINISTRADOR, VENDEDOR, REPARTIDOR, CLIENTE };</a:t>
+            </a:r>
+            <a:endParaRPr dirty="0"/>
           </a:p>
           <a:p>
             <a:pPr marL="914400" lvl="1" indent="-317500" algn="l" rtl="0">
@@ -13207,10 +13251,14 @@
               <a:buChar char="○"/>
             </a:pPr>
             <a:r>
-              <a:rPr lang="es-419"/>
-              <a:t>enum colores { ROJO, VERDE, BLUE };</a:t>
-            </a:r>
-            <a:endParaRPr/>
+              <a:rPr lang="es-419" dirty="0" err="1"/>
+              <a:t>enum</a:t>
+            </a:r>
+            <a:r>
+              <a:rPr lang="es-419" dirty="0"/>
+              <a:t> colores { ROJO, VERDE, BLUE };</a:t>
+            </a:r>
+            <a:endParaRPr dirty="0"/>
           </a:p>
         </p:txBody>
       </p:sp>
@@ -13302,7 +13350,7 @@
         </p:spPr>
         <p:txBody>
           <a:bodyPr spcFirstLastPara="1" wrap="square" lIns="91425" tIns="91425" rIns="91425" bIns="91425" anchor="t" anchorCtr="0">
-            <a:normAutofit fontScale="92500"/>
+            <a:normAutofit fontScale="92500" lnSpcReduction="10000"/>
           </a:bodyPr>
           <a:lstStyle/>
           <a:p>
@@ -13317,10 +13365,10 @@
               <a:buChar char="●"/>
             </a:pPr>
             <a:r>
-              <a:rPr lang="es-419"/>
-              <a:t>Las constantes son como variables: se almacenan en memoria pero su valor no se puede modificar:</a:t>
-            </a:r>
-            <a:endParaRPr/>
+              <a:rPr lang="es-419" dirty="0"/>
+              <a:t>Las constantes son datos cuyo valor no se puede modificar:</a:t>
+            </a:r>
+            <a:endParaRPr dirty="0"/>
           </a:p>
           <a:p>
             <a:pPr marL="914400" lvl="1" indent="-317500" algn="l" rtl="0">
@@ -13334,10 +13382,26 @@
               <a:buChar char="○"/>
             </a:pPr>
             <a:r>
-              <a:rPr lang="es-419"/>
-              <a:t>const float PI = 3.1416ñ</a:t>
-            </a:r>
-            <a:endParaRPr/>
+              <a:rPr lang="es-419" dirty="0" err="1"/>
+              <a:t>const</a:t>
+            </a:r>
+            <a:r>
+              <a:rPr lang="es-419" dirty="0"/>
+              <a:t> </a:t>
+            </a:r>
+            <a:r>
+              <a:rPr lang="es-419" dirty="0" err="1"/>
+              <a:t>float</a:t>
+            </a:r>
+            <a:r>
+              <a:rPr lang="es-419" dirty="0"/>
+              <a:t> PI = 3.1416</a:t>
+            </a:r>
+            <a:r>
+              <a:rPr lang="en-US" dirty="0"/>
+              <a:t>;</a:t>
+            </a:r>
+            <a:endParaRPr dirty="0"/>
           </a:p>
           <a:p>
             <a:pPr marL="914400" lvl="1" indent="-317500" algn="l" rtl="0">
@@ -13351,10 +13415,22 @@
               <a:buChar char="○"/>
             </a:pPr>
             <a:r>
-              <a:rPr lang="es-419"/>
-              <a:t>const int meses = 12;</a:t>
-            </a:r>
-            <a:endParaRPr/>
+              <a:rPr lang="es-419" dirty="0" err="1"/>
+              <a:t>const</a:t>
+            </a:r>
+            <a:r>
+              <a:rPr lang="es-419" dirty="0"/>
+              <a:t> </a:t>
+            </a:r>
+            <a:r>
+              <a:rPr lang="es-419" dirty="0" err="1"/>
+              <a:t>int</a:t>
+            </a:r>
+            <a:r>
+              <a:rPr lang="es-419" dirty="0"/>
+              <a:t> meses = 12;</a:t>
+            </a:r>
+            <a:endParaRPr dirty="0"/>
           </a:p>
           <a:p>
             <a:pPr marL="914400" lvl="1" indent="-317500" algn="l" rtl="0">
@@ -13368,10 +13444,30 @@
               <a:buChar char="○"/>
             </a:pPr>
             <a:r>
-              <a:rPr lang="es-419"/>
-              <a:t>const char titulo[] = “Programacion avanzada - LMAD”;</a:t>
-            </a:r>
-            <a:endParaRPr/>
+              <a:rPr lang="es-419" dirty="0" err="1"/>
+              <a:t>const</a:t>
+            </a:r>
+            <a:r>
+              <a:rPr lang="es-419" dirty="0"/>
+              <a:t> </a:t>
+            </a:r>
+            <a:r>
+              <a:rPr lang="es-419" dirty="0" err="1"/>
+              <a:t>char</a:t>
+            </a:r>
+            <a:r>
+              <a:rPr lang="es-419" dirty="0"/>
+              <a:t> titulo[] = “</a:t>
+            </a:r>
+            <a:r>
+              <a:rPr lang="es-419" dirty="0" err="1"/>
+              <a:t>Programacion</a:t>
+            </a:r>
+            <a:r>
+              <a:rPr lang="es-419" dirty="0"/>
+              <a:t> avanzada - LMAD”;</a:t>
+            </a:r>
+            <a:endParaRPr dirty="0"/>
           </a:p>
           <a:p>
             <a:pPr marL="457200" lvl="0" indent="-342900" algn="l" rtl="0">
@@ -13385,18 +13481,18 @@
               <a:buChar char="●"/>
             </a:pPr>
             <a:r>
-              <a:rPr lang="es-419"/>
+              <a:rPr lang="es-419" dirty="0"/>
               <a:t>También se pueden declarar constantes usando la directiva </a:t>
             </a:r>
             <a:r>
-              <a:rPr lang="es-419" i="1"/>
+              <a:rPr lang="es-419" i="1" dirty="0"/>
               <a:t>#define</a:t>
             </a:r>
             <a:r>
-              <a:rPr lang="es-419"/>
+              <a:rPr lang="es-419" dirty="0"/>
               <a:t>:</a:t>
             </a:r>
-            <a:endParaRPr/>
+            <a:endParaRPr dirty="0"/>
           </a:p>
           <a:p>
             <a:pPr marL="914400" lvl="1" indent="-317500" algn="l" rtl="0">
@@ -13410,10 +13506,10 @@
               <a:buChar char="○"/>
             </a:pPr>
             <a:r>
-              <a:rPr lang="es-419"/>
+              <a:rPr lang="es-419" dirty="0"/>
               <a:t>#define PI 3.141592</a:t>
             </a:r>
-            <a:endParaRPr/>
+            <a:endParaRPr dirty="0"/>
           </a:p>
           <a:p>
             <a:pPr marL="914400" lvl="1" indent="-317500" algn="l" rtl="0">
@@ -13427,10 +13523,10 @@
               <a:buChar char="○"/>
             </a:pPr>
             <a:r>
-              <a:rPr lang="es-419"/>
+              <a:rPr lang="es-419" dirty="0"/>
               <a:t>#define YEAR 2022</a:t>
             </a:r>
-            <a:endParaRPr/>
+            <a:endParaRPr dirty="0"/>
           </a:p>
           <a:p>
             <a:pPr marL="457200" lvl="0" indent="-342900" algn="l" rtl="0">
@@ -13444,10 +13540,34 @@
               <a:buChar char="●"/>
             </a:pPr>
             <a:r>
-              <a:rPr lang="es-419"/>
-              <a:t>La diferencia entre const y define es que const genera código más eficiente, además de que indica el tipo de dato por lo que el compilador puede realizar pruebas sobre este para detectar errores; una desventaja es que const consume memoria mientras que en #define su valor se incrusta directamente en el código compilado.</a:t>
-            </a:r>
-            <a:endParaRPr/>
+              <a:rPr lang="es-419" dirty="0"/>
+              <a:t>La diferencia entre </a:t>
+            </a:r>
+            <a:r>
+              <a:rPr lang="es-419" dirty="0" err="1"/>
+              <a:t>const</a:t>
+            </a:r>
+            <a:r>
+              <a:rPr lang="es-419" dirty="0"/>
+              <a:t> y define es que </a:t>
+            </a:r>
+            <a:r>
+              <a:rPr lang="es-419" dirty="0" err="1"/>
+              <a:t>const</a:t>
+            </a:r>
+            <a:r>
+              <a:rPr lang="es-419" dirty="0"/>
+              <a:t> genera código más eficiente, además de que indica el tipo de dato por lo que el compilador puede realizar pruebas sobre este para detectar errores; una desventaja es que </a:t>
+            </a:r>
+            <a:r>
+              <a:rPr lang="es-419" dirty="0" err="1"/>
+              <a:t>const</a:t>
+            </a:r>
+            <a:r>
+              <a:rPr lang="es-419" dirty="0"/>
+              <a:t> consume memoria mientras que en #define su valor se incrusta directamente en el código compilado.</a:t>
+            </a:r>
+            <a:endParaRPr dirty="0"/>
           </a:p>
         </p:txBody>
       </p:sp>
@@ -13554,10 +13674,10 @@
               <a:buChar char="●"/>
             </a:pPr>
             <a:r>
-              <a:rPr lang="es-419"/>
+              <a:rPr lang="es-419" dirty="0"/>
               <a:t>Es una posición en memoria, con nombre, donde se almacena un valor de un cierto tipo de dato:</a:t>
             </a:r>
-            <a:endParaRPr/>
+            <a:endParaRPr dirty="0"/>
           </a:p>
           <a:p>
             <a:pPr marL="914400" lvl="1" indent="-317500" algn="l" rtl="0">
@@ -13571,10 +13691,22 @@
               <a:buChar char="○"/>
             </a:pPr>
             <a:r>
-              <a:rPr lang="es-419"/>
-              <a:t>char opcion;</a:t>
-            </a:r>
-            <a:endParaRPr/>
+              <a:rPr lang="es-419" dirty="0" err="1"/>
+              <a:t>char</a:t>
+            </a:r>
+            <a:r>
+              <a:rPr lang="es-419" dirty="0"/>
+              <a:t> </a:t>
+            </a:r>
+            <a:r>
+              <a:rPr lang="es-419" dirty="0" err="1"/>
+              <a:t>opcion</a:t>
+            </a:r>
+            <a:r>
+              <a:rPr lang="es-419" dirty="0"/>
+              <a:t>;</a:t>
+            </a:r>
+            <a:endParaRPr dirty="0"/>
           </a:p>
           <a:p>
             <a:pPr marL="914400" lvl="1" indent="-317500" algn="l" rtl="0">
@@ -13588,10 +13720,22 @@
               <a:buChar char="○"/>
             </a:pPr>
             <a:r>
-              <a:rPr lang="es-419"/>
-              <a:t>int dias_de_semana;</a:t>
-            </a:r>
-            <a:endParaRPr/>
+              <a:rPr lang="es-419" dirty="0" err="1"/>
+              <a:t>int</a:t>
+            </a:r>
+            <a:r>
+              <a:rPr lang="es-419" dirty="0"/>
+              <a:t> </a:t>
+            </a:r>
+            <a:r>
+              <a:rPr lang="es-419" dirty="0" err="1"/>
+              <a:t>dias_de_semana</a:t>
+            </a:r>
+            <a:r>
+              <a:rPr lang="es-419" dirty="0"/>
+              <a:t>;</a:t>
+            </a:r>
+            <a:endParaRPr dirty="0"/>
           </a:p>
           <a:p>
             <a:pPr marL="914400" lvl="1" indent="-317500" algn="l" rtl="0">
@@ -13605,10 +13749,14 @@
               <a:buChar char="○"/>
             </a:pPr>
             <a:r>
-              <a:rPr lang="es-419"/>
-              <a:t>float salario;</a:t>
-            </a:r>
-            <a:endParaRPr/>
+              <a:rPr lang="es-419" dirty="0" err="1"/>
+              <a:t>float</a:t>
+            </a:r>
+            <a:r>
+              <a:rPr lang="es-419" dirty="0"/>
+              <a:t> salario;</a:t>
+            </a:r>
+            <a:endParaRPr dirty="0"/>
           </a:p>
           <a:p>
             <a:pPr marL="457200" lvl="0" indent="-342900" algn="l" rtl="0">
@@ -13622,10 +13770,10 @@
               <a:buChar char="●"/>
             </a:pPr>
             <a:r>
-              <a:rPr lang="es-419"/>
+              <a:rPr lang="es-419" dirty="0"/>
               <a:t>Los anteriores son ejemplos de declaraciones de variables, los siguientes son ejemplo de inicialización de variables:</a:t>
             </a:r>
-            <a:endParaRPr/>
+            <a:endParaRPr dirty="0"/>
           </a:p>
           <a:p>
             <a:pPr marL="914400" lvl="1" indent="-317500" algn="l" rtl="0">
@@ -13639,10 +13787,22 @@
               <a:buChar char="○"/>
             </a:pPr>
             <a:r>
-              <a:rPr lang="es-419"/>
-              <a:t>char opcion = ‘y’;</a:t>
-            </a:r>
-            <a:endParaRPr/>
+              <a:rPr lang="es-419" dirty="0" err="1"/>
+              <a:t>char</a:t>
+            </a:r>
+            <a:r>
+              <a:rPr lang="es-419" dirty="0"/>
+              <a:t> </a:t>
+            </a:r>
+            <a:r>
+              <a:rPr lang="es-419" dirty="0" err="1"/>
+              <a:t>opcion</a:t>
+            </a:r>
+            <a:r>
+              <a:rPr lang="es-419" dirty="0"/>
+              <a:t> = ‘y’;</a:t>
+            </a:r>
+            <a:endParaRPr dirty="0"/>
           </a:p>
           <a:p>
             <a:pPr marL="914400" lvl="1" indent="-317500" algn="l" rtl="0">
@@ -13656,10 +13816,22 @@
               <a:buChar char="○"/>
             </a:pPr>
             <a:r>
-              <a:rPr lang="es-419"/>
-              <a:t>int dias_de_semana = 7;</a:t>
-            </a:r>
-            <a:endParaRPr/>
+              <a:rPr lang="es-419" dirty="0" err="1"/>
+              <a:t>int</a:t>
+            </a:r>
+            <a:r>
+              <a:rPr lang="es-419" dirty="0"/>
+              <a:t> </a:t>
+            </a:r>
+            <a:r>
+              <a:rPr lang="es-419" dirty="0" err="1"/>
+              <a:t>dias_de_semana</a:t>
+            </a:r>
+            <a:r>
+              <a:rPr lang="es-419" dirty="0"/>
+              <a:t> = 7;</a:t>
+            </a:r>
+            <a:endParaRPr dirty="0"/>
           </a:p>
           <a:p>
             <a:pPr marL="914400" lvl="1" indent="-317500" algn="l" rtl="0">
@@ -13673,10 +13845,14 @@
               <a:buChar char="○"/>
             </a:pPr>
             <a:r>
-              <a:rPr lang="es-419"/>
-              <a:t>float salario = 2449.50;</a:t>
-            </a:r>
-            <a:endParaRPr/>
+              <a:rPr lang="es-419" dirty="0" err="1"/>
+              <a:t>float</a:t>
+            </a:r>
+            <a:r>
+              <a:rPr lang="es-419" dirty="0"/>
+              <a:t> salario = 2449.50;</a:t>
+            </a:r>
+            <a:endParaRPr dirty="0"/>
           </a:p>
         </p:txBody>
       </p:sp>
@@ -13783,10 +13959,10 @@
               <a:buChar char="●"/>
             </a:pPr>
             <a:r>
-              <a:rPr lang="es-419"/>
+              <a:rPr lang="es-419" dirty="0"/>
               <a:t>Es una posición en memoria, con nombre, donde se almacena un valor de un cierto tipo de dato:</a:t>
             </a:r>
-            <a:endParaRPr/>
+            <a:endParaRPr dirty="0"/>
           </a:p>
           <a:p>
             <a:pPr marL="914400" lvl="1" indent="-310832" algn="l" rtl="0">
@@ -13800,10 +13976,22 @@
               <a:buChar char="○"/>
             </a:pPr>
             <a:r>
-              <a:rPr lang="es-419"/>
-              <a:t>char opcion;</a:t>
-            </a:r>
-            <a:endParaRPr/>
+              <a:rPr lang="es-419" dirty="0" err="1"/>
+              <a:t>char</a:t>
+            </a:r>
+            <a:r>
+              <a:rPr lang="es-419" dirty="0"/>
+              <a:t> </a:t>
+            </a:r>
+            <a:r>
+              <a:rPr lang="es-419" dirty="0" err="1"/>
+              <a:t>opcion</a:t>
+            </a:r>
+            <a:r>
+              <a:rPr lang="es-419" dirty="0"/>
+              <a:t>;</a:t>
+            </a:r>
+            <a:endParaRPr dirty="0"/>
           </a:p>
           <a:p>
             <a:pPr marL="914400" lvl="1" indent="-310832" algn="l" rtl="0">
@@ -13817,10 +14005,22 @@
               <a:buChar char="○"/>
             </a:pPr>
             <a:r>
-              <a:rPr lang="es-419"/>
-              <a:t>int dias_de_semana;</a:t>
-            </a:r>
-            <a:endParaRPr/>
+              <a:rPr lang="es-419" dirty="0" err="1"/>
+              <a:t>int</a:t>
+            </a:r>
+            <a:r>
+              <a:rPr lang="es-419" dirty="0"/>
+              <a:t> </a:t>
+            </a:r>
+            <a:r>
+              <a:rPr lang="es-419" dirty="0" err="1"/>
+              <a:t>dias_de_semana</a:t>
+            </a:r>
+            <a:r>
+              <a:rPr lang="es-419" dirty="0"/>
+              <a:t>;</a:t>
+            </a:r>
+            <a:endParaRPr dirty="0"/>
           </a:p>
           <a:p>
             <a:pPr marL="914400" lvl="1" indent="-310832" algn="l" rtl="0">
@@ -13834,10 +14034,14 @@
               <a:buChar char="○"/>
             </a:pPr>
             <a:r>
-              <a:rPr lang="es-419"/>
-              <a:t>float salario;</a:t>
-            </a:r>
-            <a:endParaRPr/>
+              <a:rPr lang="es-419" dirty="0" err="1"/>
+              <a:t>float</a:t>
+            </a:r>
+            <a:r>
+              <a:rPr lang="es-419" dirty="0"/>
+              <a:t> salario;</a:t>
+            </a:r>
+            <a:endParaRPr dirty="0"/>
           </a:p>
           <a:p>
             <a:pPr marL="457200" lvl="0" indent="-334327" algn="l" rtl="0">
@@ -13851,10 +14055,10 @@
               <a:buChar char="●"/>
             </a:pPr>
             <a:r>
-              <a:rPr lang="es-419"/>
+              <a:rPr lang="es-419" dirty="0"/>
               <a:t>Los anteriores son ejemplos de declaraciones de variables, los siguientes son ejemplo de inicialización de variables:</a:t>
             </a:r>
-            <a:endParaRPr/>
+            <a:endParaRPr dirty="0"/>
           </a:p>
           <a:p>
             <a:pPr marL="914400" lvl="1" indent="-310832" algn="l" rtl="0">
@@ -13868,10 +14072,22 @@
               <a:buChar char="○"/>
             </a:pPr>
             <a:r>
-              <a:rPr lang="es-419"/>
-              <a:t>char opcion = ‘y’;</a:t>
-            </a:r>
-            <a:endParaRPr/>
+              <a:rPr lang="es-419" dirty="0" err="1"/>
+              <a:t>char</a:t>
+            </a:r>
+            <a:r>
+              <a:rPr lang="es-419" dirty="0"/>
+              <a:t> </a:t>
+            </a:r>
+            <a:r>
+              <a:rPr lang="es-419" dirty="0" err="1"/>
+              <a:t>opcion</a:t>
+            </a:r>
+            <a:r>
+              <a:rPr lang="es-419" dirty="0"/>
+              <a:t> = ‘y’;</a:t>
+            </a:r>
+            <a:endParaRPr dirty="0"/>
           </a:p>
           <a:p>
             <a:pPr marL="914400" lvl="1" indent="-310832" algn="l" rtl="0">
@@ -13885,10 +14101,22 @@
               <a:buChar char="○"/>
             </a:pPr>
             <a:r>
-              <a:rPr lang="es-419"/>
-              <a:t>int dias_de_semana = 7;</a:t>
-            </a:r>
-            <a:endParaRPr/>
+              <a:rPr lang="es-419" dirty="0" err="1"/>
+              <a:t>int</a:t>
+            </a:r>
+            <a:r>
+              <a:rPr lang="es-419" dirty="0"/>
+              <a:t> </a:t>
+            </a:r>
+            <a:r>
+              <a:rPr lang="es-419" dirty="0" err="1"/>
+              <a:t>dias_de_semana</a:t>
+            </a:r>
+            <a:r>
+              <a:rPr lang="es-419" dirty="0"/>
+              <a:t> = 7;</a:t>
+            </a:r>
+            <a:endParaRPr dirty="0"/>
           </a:p>
           <a:p>
             <a:pPr marL="914400" lvl="1" indent="-310832" algn="l" rtl="0">
@@ -13902,10 +14130,14 @@
               <a:buChar char="○"/>
             </a:pPr>
             <a:r>
-              <a:rPr lang="es-419"/>
-              <a:t>float salario = 2449.50;</a:t>
-            </a:r>
-            <a:endParaRPr/>
+              <a:rPr lang="es-419" dirty="0" err="1"/>
+              <a:t>float</a:t>
+            </a:r>
+            <a:r>
+              <a:rPr lang="es-419" dirty="0"/>
+              <a:t> salario = 2449.50;</a:t>
+            </a:r>
+            <a:endParaRPr dirty="0"/>
           </a:p>
           <a:p>
             <a:pPr marL="457200" lvl="0" indent="-334327" algn="l" rtl="0">
@@ -13919,10 +14151,18 @@
               <a:buChar char="●"/>
             </a:pPr>
             <a:r>
-              <a:rPr lang="es-419"/>
-              <a:t>Duración de una variable (alcance/ámbito/scope)</a:t>
-            </a:r>
-            <a:endParaRPr/>
+              <a:rPr lang="es-419" dirty="0"/>
+              <a:t>Duración de una variable (alcance/ámbito/</a:t>
+            </a:r>
+            <a:r>
+              <a:rPr lang="es-419" dirty="0" err="1"/>
+              <a:t>scope</a:t>
+            </a:r>
+            <a:r>
+              <a:rPr lang="es-419" dirty="0"/>
+              <a:t>)</a:t>
+            </a:r>
+            <a:endParaRPr dirty="0"/>
           </a:p>
           <a:p>
             <a:pPr marL="914400" lvl="1" indent="-310832" algn="l" rtl="0">
@@ -13936,10 +14176,10 @@
               <a:buChar char="○"/>
             </a:pPr>
             <a:r>
-              <a:rPr lang="es-419"/>
+              <a:rPr lang="es-419" dirty="0"/>
               <a:t>Variables globales: Son comunes a todas las funciones del programa</a:t>
             </a:r>
-            <a:endParaRPr/>
+            <a:endParaRPr dirty="0"/>
           </a:p>
           <a:p>
             <a:pPr marL="914400" lvl="1" indent="-310832" algn="l" rtl="0">
@@ -13953,10 +14193,10 @@
               <a:buChar char="○"/>
             </a:pPr>
             <a:r>
-              <a:rPr lang="es-419"/>
+              <a:rPr lang="es-419" dirty="0"/>
               <a:t>Variables locales: Sólo pueden ser usadas en el interior del bloque de código donde se declararon.</a:t>
             </a:r>
-            <a:endParaRPr/>
+            <a:endParaRPr dirty="0"/>
           </a:p>
         </p:txBody>
       </p:sp>
@@ -14309,10 +14549,10 @@
               <a:buChar char="●"/>
             </a:pPr>
             <a:r>
-              <a:rPr lang="es-419"/>
+              <a:rPr lang="es-419" dirty="0"/>
               <a:t>Operadores de asignación</a:t>
             </a:r>
-            <a:endParaRPr/>
+            <a:endParaRPr dirty="0"/>
           </a:p>
           <a:p>
             <a:pPr marL="457200" lvl="0" indent="-342900" algn="l" rtl="0">
@@ -14326,10 +14566,10 @@
               <a:buChar char="●"/>
             </a:pPr>
             <a:r>
-              <a:rPr lang="es-419"/>
+              <a:rPr lang="es-419" dirty="0"/>
               <a:t>Operadores aritméticos</a:t>
             </a:r>
-            <a:endParaRPr/>
+            <a:endParaRPr dirty="0"/>
           </a:p>
           <a:p>
             <a:pPr marL="457200" lvl="0" indent="-342900" algn="l" rtl="0">
@@ -14343,10 +14583,10 @@
               <a:buChar char="●"/>
             </a:pPr>
             <a:r>
-              <a:rPr lang="es-419"/>
+              <a:rPr lang="es-419" dirty="0"/>
               <a:t>Asociatividad</a:t>
             </a:r>
-            <a:endParaRPr/>
+            <a:endParaRPr dirty="0"/>
           </a:p>
           <a:p>
             <a:pPr marL="457200" lvl="0" indent="-342900" algn="l" rtl="0">
@@ -14360,10 +14600,10 @@
               <a:buChar char="●"/>
             </a:pPr>
             <a:r>
-              <a:rPr lang="es-419"/>
+              <a:rPr lang="es-419" dirty="0"/>
               <a:t>Operadores de incremento y decremento</a:t>
             </a:r>
-            <a:endParaRPr/>
+            <a:endParaRPr dirty="0"/>
           </a:p>
           <a:p>
             <a:pPr marL="457200" lvl="0" indent="-342900" algn="l" rtl="0">
@@ -14377,10 +14617,10 @@
               <a:buChar char="●"/>
             </a:pPr>
             <a:r>
-              <a:rPr lang="es-419"/>
+              <a:rPr lang="es-419" dirty="0"/>
               <a:t>Operadores relacionales</a:t>
             </a:r>
-            <a:endParaRPr/>
+            <a:endParaRPr dirty="0"/>
           </a:p>
           <a:p>
             <a:pPr marL="457200" lvl="0" indent="-342900" algn="l" rtl="0">
@@ -14394,10 +14634,10 @@
               <a:buChar char="●"/>
             </a:pPr>
             <a:r>
-              <a:rPr lang="es-419"/>
+              <a:rPr lang="es-419" dirty="0"/>
               <a:t>Operadores lógicos (evaluación en cortocircuito)</a:t>
             </a:r>
-            <a:endParaRPr/>
+            <a:endParaRPr dirty="0"/>
           </a:p>
           <a:p>
             <a:pPr marL="457200" lvl="0" indent="-342900" algn="l" rtl="0">
@@ -14411,10 +14651,10 @@
               <a:buChar char="●"/>
             </a:pPr>
             <a:r>
-              <a:rPr lang="es-419"/>
+              <a:rPr lang="es-419" dirty="0"/>
               <a:t>Operador Condicional</a:t>
             </a:r>
-            <a:endParaRPr/>
+            <a:endParaRPr dirty="0"/>
           </a:p>
           <a:p>
             <a:pPr marL="457200" lvl="0" indent="-342900" algn="l" rtl="0">
@@ -14428,10 +14668,10 @@
               <a:buChar char="●"/>
             </a:pPr>
             <a:r>
-              <a:rPr lang="es-419"/>
+              <a:rPr lang="es-419" dirty="0"/>
               <a:t>Operadores de direcciones</a:t>
             </a:r>
-            <a:endParaRPr/>
+            <a:endParaRPr dirty="0"/>
           </a:p>
           <a:p>
             <a:pPr marL="457200" lvl="0" indent="-342900" algn="l" rtl="0">
@@ -14445,10 +14685,10 @@
               <a:buChar char="●"/>
             </a:pPr>
             <a:r>
-              <a:rPr lang="es-419"/>
+              <a:rPr lang="es-419" dirty="0"/>
               <a:t>Operadores especiales</a:t>
             </a:r>
-            <a:endParaRPr/>
+            <a:endParaRPr dirty="0"/>
           </a:p>
           <a:p>
             <a:pPr marL="457200" lvl="0" indent="-342900" algn="l" rtl="0">
@@ -14462,10 +14702,10 @@
               <a:buChar char="●"/>
             </a:pPr>
             <a:r>
-              <a:rPr lang="es-419"/>
+              <a:rPr lang="es-419" dirty="0"/>
               <a:t>Prioridad y Asociatividad</a:t>
             </a:r>
-            <a:endParaRPr/>
+            <a:endParaRPr dirty="0"/>
           </a:p>
         </p:txBody>
       </p:sp>
@@ -14688,10 +14928,10 @@
               <a:buNone/>
             </a:pPr>
             <a:r>
-              <a:rPr lang="es-419"/>
+              <a:rPr lang="es-419" dirty="0"/>
               <a:t>Operadores de asignación</a:t>
             </a:r>
-            <a:endParaRPr/>
+            <a:endParaRPr dirty="0"/>
           </a:p>
         </p:txBody>
       </p:sp>
@@ -14699,11 +14939,17 @@
         <p:nvGraphicFramePr>
           <p:cNvPr id="176" name="Google Shape;176;p31"/>
           <p:cNvGraphicFramePr/>
-          <p:nvPr/>
+          <p:nvPr>
+            <p:extLst>
+              <p:ext uri="{D42A27DB-BD31-4B8C-83A1-F6EECF244321}">
+                <p14:modId xmlns:p14="http://schemas.microsoft.com/office/powerpoint/2010/main" val="1240299943"/>
+              </p:ext>
+            </p:extLst>
+          </p:nvPr>
         </p:nvGraphicFramePr>
         <p:xfrm>
-          <a:off x="856300" y="2576700"/>
-          <a:ext cx="7239000" cy="2377260"/>
+          <a:off x="1034218" y="2576700"/>
+          <a:ext cx="7061082" cy="2377260"/>
         </p:xfrm>
         <a:graphic>
           <a:graphicData uri="http://schemas.openxmlformats.org/drawingml/2006/table">
@@ -14713,7 +14959,7 @@
                 <a:tableStyleId>{11419785-70A5-4291-BBB3-00572DC79438}</a:tableStyleId>
               </a:tblPr>
               <a:tblGrid>
-                <a:gridCol w="2413000">
+                <a:gridCol w="2235082">
                   <a:extLst>
                     <a:ext uri="{9D8B030D-6E8A-4147-A177-3AD203B41FA5}">
                       <a16:colId xmlns:a16="http://schemas.microsoft.com/office/drawing/2014/main" val="20000"/>
@@ -14827,10 +15073,10 @@
                         <a:buNone/>
                       </a:pPr>
                       <a:r>
-                        <a:rPr lang="es-419"/>
+                        <a:rPr lang="es-419" dirty="0"/>
                         <a:t>+=</a:t>
                       </a:r>
-                      <a:endParaRPr/>
+                      <a:endParaRPr dirty="0"/>
                     </a:p>
                   </a:txBody>
                   <a:tcPr marL="91425" marR="91425" marT="91425" marB="91425"/>
@@ -14850,10 +15096,10 @@
                         <a:buNone/>
                       </a:pPr>
                       <a:r>
-                        <a:rPr lang="es-419"/>
+                        <a:rPr lang="es-419" dirty="0"/>
                         <a:t>m += n</a:t>
                       </a:r>
-                      <a:endParaRPr/>
+                      <a:endParaRPr dirty="0"/>
                     </a:p>
                   </a:txBody>
                   <a:tcPr marL="91425" marR="91425" marT="91425" marB="91425"/>
@@ -14873,10 +15119,10 @@
                         <a:buNone/>
                       </a:pPr>
                       <a:r>
-                        <a:rPr lang="es-419"/>
+                        <a:rPr lang="es-419" dirty="0"/>
                         <a:t>m = m + n</a:t>
                       </a:r>
-                      <a:endParaRPr/>
+                      <a:endParaRPr dirty="0"/>
                     </a:p>
                   </a:txBody>
                   <a:tcPr marL="91425" marR="91425" marT="91425" marB="91425"/>
@@ -14903,10 +15149,10 @@
                         <a:buNone/>
                       </a:pPr>
                       <a:r>
-                        <a:rPr lang="es-419"/>
+                        <a:rPr lang="es-419" dirty="0"/>
                         <a:t>-=</a:t>
                       </a:r>
-                      <a:endParaRPr/>
+                      <a:endParaRPr dirty="0"/>
                     </a:p>
                   </a:txBody>
                   <a:tcPr marL="91425" marR="91425" marT="91425" marB="91425"/>
@@ -14989,10 +15235,10 @@
                         <a:buNone/>
                       </a:pPr>
                       <a:r>
-                        <a:rPr lang="es-419"/>
+                        <a:rPr lang="es-419" dirty="0"/>
                         <a:t>*=</a:t>
                       </a:r>
-                      <a:endParaRPr/>
+                      <a:endParaRPr dirty="0"/>
                     </a:p>
                   </a:txBody>
                   <a:tcPr marL="91425" marR="91425" marT="91425" marB="91425"/>
@@ -15075,10 +15321,10 @@
                         <a:buNone/>
                       </a:pPr>
                       <a:r>
-                        <a:rPr lang="es-419"/>
+                        <a:rPr lang="es-419" dirty="0"/>
                         <a:t>/=</a:t>
                       </a:r>
-                      <a:endParaRPr/>
+                      <a:endParaRPr dirty="0"/>
                     </a:p>
                   </a:txBody>
                   <a:tcPr marL="91425" marR="91425" marT="91425" marB="91425"/>
@@ -15217,10 +15463,10 @@
                         <a:buNone/>
                       </a:pPr>
                       <a:r>
-                        <a:rPr lang="es-419"/>
+                        <a:rPr lang="es-419" dirty="0"/>
                         <a:t>m = m % n</a:t>
                       </a:r>
-                      <a:endParaRPr/>
+                      <a:endParaRPr dirty="0"/>
                     </a:p>
                   </a:txBody>
                   <a:tcPr marL="91425" marR="91425" marT="91425" marB="91425"/>
@@ -15271,18 +15517,18 @@
               <a:buChar char="●"/>
             </a:pPr>
             <a:r>
-              <a:rPr lang="es-419"/>
+              <a:rPr lang="es-419" dirty="0"/>
               <a:t>El operador </a:t>
             </a:r>
             <a:r>
-              <a:rPr lang="es-419" b="1" i="1"/>
+              <a:rPr lang="es-419" b="1" i="1" dirty="0"/>
               <a:t> = </a:t>
             </a:r>
             <a:r>
-              <a:rPr lang="es-419"/>
+              <a:rPr lang="es-419" dirty="0"/>
               <a:t>asigna el valor de la expresión derecha a la variable situada a su izquierda</a:t>
             </a:r>
-            <a:endParaRPr/>
+            <a:endParaRPr dirty="0"/>
           </a:p>
           <a:p>
             <a:pPr marL="914400" lvl="1" indent="-317500" algn="l" rtl="0">
@@ -15296,10 +15542,14 @@
               <a:buChar char="○"/>
             </a:pPr>
             <a:r>
-              <a:rPr lang="es-419"/>
-              <a:t>código = 4567;</a:t>
-            </a:r>
-            <a:endParaRPr/>
+              <a:rPr lang="es-419" dirty="0" err="1"/>
+              <a:t>codigo</a:t>
+            </a:r>
+            <a:r>
+              <a:rPr lang="es-419" dirty="0"/>
+              <a:t> = 4567;</a:t>
+            </a:r>
+            <a:endParaRPr dirty="0"/>
           </a:p>
           <a:p>
             <a:pPr marL="914400" lvl="1" indent="-317500" algn="l" rtl="0">
@@ -15313,10 +15563,14 @@
               <a:buChar char="○"/>
             </a:pPr>
             <a:r>
-              <a:rPr lang="es-419"/>
-              <a:t>coordX = 7.1;</a:t>
-            </a:r>
-            <a:endParaRPr/>
+              <a:rPr lang="es-419" dirty="0" err="1"/>
+              <a:t>coordX</a:t>
+            </a:r>
+            <a:r>
+              <a:rPr lang="es-419" dirty="0"/>
+              <a:t> = 7.1;</a:t>
+            </a:r>
+            <a:endParaRPr dirty="0"/>
           </a:p>
           <a:p>
             <a:pPr marL="914400" lvl="1" indent="-317500" algn="l" rtl="0">
@@ -15330,10 +15584,14 @@
               <a:buChar char="○"/>
             </a:pPr>
             <a:r>
-              <a:rPr lang="es-419"/>
-              <a:t>coordY = 8.2;</a:t>
-            </a:r>
-            <a:endParaRPr/>
+              <a:rPr lang="es-419" dirty="0" err="1"/>
+              <a:t>coordY</a:t>
+            </a:r>
+            <a:r>
+              <a:rPr lang="es-419" dirty="0"/>
+              <a:t> = 8.2; </a:t>
+            </a:r>
+            <a:endParaRPr dirty="0"/>
           </a:p>
           <a:p>
             <a:pPr marL="457200" lvl="0" indent="-342900" algn="l" rtl="0">
@@ -15347,10 +15605,10 @@
               <a:buChar char="●"/>
             </a:pPr>
             <a:r>
-              <a:rPr lang="es-419"/>
+              <a:rPr lang="es-419" dirty="0"/>
               <a:t>Es un operador asociativo por la derecha, permitiendo hacer: a = b = c = 5;</a:t>
             </a:r>
-            <a:endParaRPr/>
+            <a:endParaRPr dirty="0"/>
           </a:p>
         </p:txBody>
       </p:sp>
@@ -16234,10 +16492,10 @@
                         <a:buNone/>
                       </a:pPr>
                       <a:r>
-                        <a:rPr lang="es-419"/>
+                        <a:rPr lang="es-419" dirty="0"/>
                         <a:t>%</a:t>
                       </a:r>
-                      <a:endParaRPr/>
+                      <a:endParaRPr dirty="0"/>
                     </a:p>
                   </a:txBody>
                   <a:tcPr marL="91425" marR="91425" marT="91425" marB="91425"/>
@@ -16257,10 +16515,10 @@
                         <a:buNone/>
                       </a:pPr>
                       <a:r>
-                        <a:rPr lang="es-419"/>
+                        <a:rPr lang="es-419" dirty="0"/>
                         <a:t>División entera: residuo</a:t>
                       </a:r>
-                      <a:endParaRPr/>
+                      <a:endParaRPr dirty="0"/>
                     </a:p>
                   </a:txBody>
                   <a:tcPr marL="91425" marR="91425" marT="91425" marB="91425"/>
@@ -16299,10 +16557,10 @@
                         <a:buNone/>
                       </a:pPr>
                       <a:r>
-                        <a:rPr lang="es-419"/>
+                        <a:rPr lang="es-419" dirty="0"/>
                         <a:t>z % 2</a:t>
                       </a:r>
-                      <a:endParaRPr/>
+                      <a:endParaRPr dirty="0"/>
                     </a:p>
                   </a:txBody>
                   <a:tcPr marL="91425" marR="91425" marT="91425" marB="91425"/>
@@ -16420,10 +16678,10 @@
               <a:buChar char="●"/>
             </a:pPr>
             <a:r>
-              <a:rPr lang="es-419"/>
+              <a:rPr lang="es-419" dirty="0"/>
               <a:t>Determina el orden en que se agrupan los operadores de igual prioridad, es decir de derecha a izquierda o de izquierda a derecha, por ejemplo</a:t>
             </a:r>
-            <a:endParaRPr/>
+            <a:endParaRPr dirty="0"/>
           </a:p>
           <a:p>
             <a:pPr marL="914400" lvl="1" indent="-317500" algn="l" rtl="0">
@@ -16437,10 +16695,10 @@
               <a:buChar char="○"/>
             </a:pPr>
             <a:r>
-              <a:rPr lang="es-419"/>
+              <a:rPr lang="es-419" dirty="0"/>
               <a:t>La expresión 3 * 4 + 5 es igual a</a:t>
             </a:r>
-            <a:endParaRPr/>
+            <a:endParaRPr dirty="0"/>
           </a:p>
           <a:p>
             <a:pPr marL="1371600" lvl="2" indent="-317500" algn="l" rtl="0">
@@ -16454,10 +16712,10 @@
               <a:buChar char="■"/>
             </a:pPr>
             <a:r>
-              <a:rPr lang="es-419"/>
+              <a:rPr lang="es-419" dirty="0"/>
               <a:t>17??</a:t>
             </a:r>
-            <a:endParaRPr/>
+            <a:endParaRPr dirty="0"/>
           </a:p>
           <a:p>
             <a:pPr marL="1371600" lvl="2" indent="-317500" algn="l" rtl="0">
@@ -16471,10 +16729,10 @@
               <a:buChar char="■"/>
             </a:pPr>
             <a:r>
-              <a:rPr lang="es-419"/>
+              <a:rPr lang="es-419" dirty="0"/>
               <a:t>o 60??</a:t>
             </a:r>
-            <a:endParaRPr/>
+            <a:endParaRPr dirty="0"/>
           </a:p>
           <a:p>
             <a:pPr marL="457200" lvl="0" indent="-342900" algn="l" rtl="0">
@@ -16488,10 +16746,10 @@
               <a:buChar char="●"/>
             </a:pPr>
             <a:r>
-              <a:rPr lang="es-419"/>
+              <a:rPr lang="es-419" dirty="0"/>
               <a:t>Los paréntesis se pueden utilizar para cambiar el orden usual de evaluación de una expresión determinada por su prioridad y asociatividad </a:t>
             </a:r>
-            <a:endParaRPr/>
+            <a:endParaRPr dirty="0"/>
           </a:p>
           <a:p>
             <a:pPr marL="914400" lvl="1" indent="-317500" algn="l" rtl="0">
@@ -16505,10 +16763,10 @@
               <a:buChar char="○"/>
             </a:pPr>
             <a:r>
-              <a:rPr lang="es-419"/>
+              <a:rPr lang="es-419" dirty="0"/>
               <a:t>4 * 5 + 6 = 26</a:t>
             </a:r>
-            <a:endParaRPr/>
+            <a:endParaRPr dirty="0"/>
           </a:p>
           <a:p>
             <a:pPr marL="914400" lvl="1" indent="-317500" algn="l" rtl="0">
@@ -16522,10 +16780,10 @@
               <a:buChar char="○"/>
             </a:pPr>
             <a:r>
-              <a:rPr lang="es-419"/>
+              <a:rPr lang="es-419" dirty="0"/>
               <a:t>4 * (5 + 6) = 44</a:t>
             </a:r>
-            <a:endParaRPr/>
+            <a:endParaRPr dirty="0"/>
           </a:p>
           <a:p>
             <a:pPr marL="457200" lvl="0" indent="0" algn="l" rtl="0">
@@ -16537,7 +16795,7 @@
               </a:spcAft>
               <a:buNone/>
             </a:pPr>
-            <a:endParaRPr/>
+            <a:endParaRPr dirty="0"/>
           </a:p>
         </p:txBody>
       </p:sp>
@@ -16644,42 +16902,42 @@
               <a:buChar char="●"/>
             </a:pPr>
             <a:r>
-              <a:rPr lang="es-419"/>
+              <a:rPr lang="es-419" dirty="0"/>
               <a:t>Los operadores </a:t>
             </a:r>
             <a:r>
-              <a:rPr lang="es-419" i="1"/>
+              <a:rPr lang="es-419" i="1" dirty="0"/>
               <a:t>++ </a:t>
             </a:r>
             <a:r>
-              <a:rPr lang="es-419"/>
+              <a:rPr lang="es-419" dirty="0"/>
               <a:t>y </a:t>
             </a:r>
             <a:r>
-              <a:rPr lang="es-419" i="1"/>
-              <a:t>- -, </a:t>
-            </a:r>
-            <a:r>
-              <a:rPr lang="es-419"/>
+              <a:rPr lang="es-419" i="1" dirty="0"/>
+              <a:t>--, </a:t>
+            </a:r>
+            <a:r>
+              <a:rPr lang="es-419" dirty="0"/>
               <a:t>denominados de </a:t>
             </a:r>
             <a:r>
-              <a:rPr lang="es-419" i="1"/>
+              <a:rPr lang="es-419" i="1" dirty="0"/>
               <a:t>incremento </a:t>
             </a:r>
             <a:r>
-              <a:rPr lang="es-419"/>
+              <a:rPr lang="es-419" dirty="0"/>
               <a:t>y </a:t>
             </a:r>
             <a:r>
-              <a:rPr lang="es-419" i="1"/>
+              <a:rPr lang="es-419" i="1" dirty="0"/>
               <a:t>decremento</a:t>
             </a:r>
             <a:r>
-              <a:rPr lang="es-419"/>
+              <a:rPr lang="es-419" dirty="0"/>
               <a:t>, suman o restan 1 a su argumento, respectivamente, cada vez que se aplican a una variable.</a:t>
             </a:r>
-            <a:endParaRPr/>
+            <a:endParaRPr dirty="0"/>
           </a:p>
           <a:p>
             <a:pPr marL="457200" lvl="0" indent="-342900" algn="l" rtl="0">
@@ -16693,10 +16951,10 @@
               <a:buChar char="●"/>
             </a:pPr>
             <a:r>
-              <a:rPr lang="es-419"/>
+              <a:rPr lang="es-419" dirty="0"/>
               <a:t>Estas operaciones pueden usarse de dos formas, como prefijo o como sufijo.</a:t>
             </a:r>
-            <a:endParaRPr/>
+            <a:endParaRPr dirty="0"/>
           </a:p>
           <a:p>
             <a:pPr marL="914400" lvl="1" indent="-317500" algn="l" rtl="0">
@@ -16710,10 +16968,26 @@
               <a:buChar char="○"/>
             </a:pPr>
             <a:r>
-              <a:rPr lang="es-419"/>
-              <a:t>prefijo o preincremento/predecremento: ++i; - -a;</a:t>
-            </a:r>
-            <a:endParaRPr/>
+              <a:rPr lang="es-419" dirty="0"/>
+              <a:t>prefijo o </a:t>
+            </a:r>
+            <a:r>
+              <a:rPr lang="es-419" dirty="0" err="1"/>
+              <a:t>preincremento</a:t>
+            </a:r>
+            <a:r>
+              <a:rPr lang="es-419" dirty="0"/>
+              <a:t>/</a:t>
+            </a:r>
+            <a:r>
+              <a:rPr lang="es-419" dirty="0" err="1"/>
+              <a:t>predecremento</a:t>
+            </a:r>
+            <a:r>
+              <a:rPr lang="es-419" dirty="0"/>
+              <a:t>: ++i; - -a;</a:t>
+            </a:r>
+            <a:endParaRPr dirty="0"/>
           </a:p>
           <a:p>
             <a:pPr marL="914400" lvl="1" indent="-317500" algn="l" rtl="0">
@@ -16727,10 +17001,34 @@
               <a:buChar char="○"/>
             </a:pPr>
             <a:r>
-              <a:rPr lang="es-419"/>
-              <a:t>sufijo o postincremento/postdecremento: c++; j- -;</a:t>
-            </a:r>
-            <a:endParaRPr/>
+              <a:rPr lang="es-419" dirty="0"/>
+              <a:t>sufijo o </a:t>
+            </a:r>
+            <a:r>
+              <a:rPr lang="es-419" dirty="0" err="1"/>
+              <a:t>postincremento</a:t>
+            </a:r>
+            <a:r>
+              <a:rPr lang="es-419" dirty="0"/>
+              <a:t>/</a:t>
+            </a:r>
+            <a:r>
+              <a:rPr lang="es-419" dirty="0" err="1"/>
+              <a:t>postdecremento</a:t>
+            </a:r>
+            <a:r>
+              <a:rPr lang="es-419" dirty="0"/>
+              <a:t>: </a:t>
+            </a:r>
+            <a:r>
+              <a:rPr lang="es-419" dirty="0" err="1"/>
+              <a:t>c++</a:t>
+            </a:r>
+            <a:r>
+              <a:rPr lang="es-419" dirty="0"/>
+              <a:t>; j- -;</a:t>
+            </a:r>
+            <a:endParaRPr dirty="0"/>
           </a:p>
           <a:p>
             <a:pPr marL="914400" lvl="0" indent="0" algn="l" rtl="0">
@@ -16743,10 +17041,10 @@
               <a:buNone/>
             </a:pPr>
             <a:r>
-              <a:rPr lang="es-419"/>
+              <a:rPr lang="es-419" dirty="0"/>
               <a:t> </a:t>
             </a:r>
-            <a:endParaRPr/>
+            <a:endParaRPr dirty="0"/>
           </a:p>
         </p:txBody>
       </p:sp>
@@ -16829,7 +17127,7 @@
         </p:nvSpPr>
         <p:spPr>
           <a:xfrm>
-            <a:off x="278413" y="712925"/>
+            <a:off x="281566" y="627792"/>
             <a:ext cx="8520600" cy="3416400"/>
           </a:xfrm>
           <a:prstGeom prst="rect">
@@ -16838,7 +17136,7 @@
         </p:spPr>
         <p:txBody>
           <a:bodyPr spcFirstLastPara="1" wrap="square" lIns="91425" tIns="91425" rIns="91425" bIns="91425" anchor="t" anchorCtr="0">
-            <a:normAutofit fontScale="92500" lnSpcReduction="10000"/>
+            <a:normAutofit/>
           </a:bodyPr>
           <a:lstStyle/>
           <a:p>
@@ -16853,34 +17151,34 @@
               <a:buChar char="●"/>
             </a:pPr>
             <a:r>
-              <a:rPr lang="es-419" dirty="0"/>
+              <a:rPr lang="es-419" sz="1100" dirty="0"/>
               <a:t>Para expresiones booleanas, existe el tipo </a:t>
             </a:r>
             <a:r>
-              <a:rPr lang="es-419" i="1" dirty="0" err="1"/>
+              <a:rPr lang="es-419" sz="1100" i="1" dirty="0" err="1"/>
               <a:t>bool</a:t>
             </a:r>
             <a:r>
-              <a:rPr lang="es-419" dirty="0"/>
+              <a:rPr lang="es-419" sz="1100" dirty="0"/>
               <a:t>, con el que podemos manejar valores como </a:t>
             </a:r>
             <a:r>
-              <a:rPr lang="es-419" b="1" i="1" dirty="0"/>
+              <a:rPr lang="es-419" sz="1100" b="1" i="1" dirty="0"/>
               <a:t>true </a:t>
             </a:r>
             <a:r>
-              <a:rPr lang="es-419" dirty="0"/>
+              <a:rPr lang="es-419" sz="1100" dirty="0"/>
               <a:t>y</a:t>
             </a:r>
             <a:r>
-              <a:rPr lang="es-419" b="1" i="1" dirty="0"/>
+              <a:rPr lang="es-419" sz="1100" b="1" i="1" dirty="0"/>
               <a:t> false.</a:t>
             </a:r>
             <a:r>
-              <a:rPr lang="es-419" dirty="0"/>
+              <a:rPr lang="es-419" sz="1100" dirty="0"/>
               <a:t> </a:t>
             </a:r>
-            <a:endParaRPr dirty="0"/>
+            <a:endParaRPr sz="1100" dirty="0"/>
           </a:p>
           <a:p>
             <a:pPr marL="457200" lvl="0" indent="-300037" algn="l" rtl="0">
@@ -16894,18 +17192,18 @@
               <a:buChar char="●"/>
             </a:pPr>
             <a:r>
-              <a:rPr lang="es-419" dirty="0"/>
+              <a:rPr lang="es-419" sz="1100" dirty="0"/>
               <a:t>Además del tipo booleano, podemos usar el tipo </a:t>
             </a:r>
             <a:r>
-              <a:rPr lang="es-419" dirty="0" err="1"/>
+              <a:rPr lang="es-419" sz="1100" dirty="0" err="1"/>
               <a:t>int</a:t>
             </a:r>
             <a:r>
-              <a:rPr lang="es-419" dirty="0"/>
+              <a:rPr lang="es-419" sz="1100" dirty="0"/>
               <a:t> para manejar condiciones de verdadero o falso, de tal forma que:</a:t>
             </a:r>
-            <a:endParaRPr dirty="0"/>
+            <a:endParaRPr sz="1100" dirty="0"/>
           </a:p>
           <a:p>
             <a:pPr marL="914400" lvl="1" indent="-284162" algn="l" rtl="0">
@@ -16919,10 +17217,10 @@
               <a:buChar char="○"/>
             </a:pPr>
             <a:r>
-              <a:rPr lang="es-419" dirty="0"/>
+              <a:rPr lang="es-419" sz="1000" dirty="0"/>
               <a:t>true = valor distinto de cero</a:t>
             </a:r>
-            <a:endParaRPr dirty="0"/>
+            <a:endParaRPr sz="1000" dirty="0"/>
           </a:p>
           <a:p>
             <a:pPr marL="914400" lvl="1" indent="-284162" algn="l" rtl="0">
@@ -16936,10 +17234,10 @@
               <a:buChar char="○"/>
             </a:pPr>
             <a:r>
-              <a:rPr lang="es-419" dirty="0"/>
+              <a:rPr lang="es-419" sz="1000" dirty="0"/>
               <a:t>false = cero</a:t>
             </a:r>
-            <a:endParaRPr dirty="0"/>
+            <a:endParaRPr sz="1000" dirty="0"/>
           </a:p>
           <a:p>
             <a:pPr marL="457200" lvl="0" indent="-300037" algn="l" rtl="0">
@@ -16953,34 +17251,34 @@
               <a:buChar char="●"/>
             </a:pPr>
             <a:r>
-              <a:rPr lang="es-419" dirty="0"/>
+              <a:rPr lang="es-419" sz="1100" dirty="0"/>
               <a:t>Estos operadores se usan normalmente en sentencias (</a:t>
             </a:r>
             <a:r>
-              <a:rPr lang="es-419" i="1" dirty="0" err="1"/>
+              <a:rPr lang="es-419" sz="1100" i="1" dirty="0" err="1"/>
               <a:t>if</a:t>
             </a:r>
             <a:r>
-              <a:rPr lang="es-419" dirty="0"/>
+              <a:rPr lang="es-419" sz="1100" dirty="0"/>
               <a:t>) o de iteración (</a:t>
             </a:r>
             <a:r>
-              <a:rPr lang="es-419" i="1" dirty="0" err="1"/>
+              <a:rPr lang="es-419" sz="1100" i="1" dirty="0" err="1"/>
               <a:t>while</a:t>
             </a:r>
             <a:r>
-              <a:rPr lang="es-419" i="1" dirty="0"/>
+              <a:rPr lang="es-419" sz="1100" i="1" dirty="0"/>
               <a:t>, </a:t>
             </a:r>
             <a:r>
-              <a:rPr lang="es-419" i="1" dirty="0" err="1"/>
+              <a:rPr lang="es-419" sz="1100" i="1" dirty="0" err="1"/>
               <a:t>for</a:t>
             </a:r>
             <a:r>
-              <a:rPr lang="es-419" dirty="0"/>
+              <a:rPr lang="es-419" sz="1100" dirty="0"/>
               <a:t>)</a:t>
             </a:r>
-            <a:endParaRPr dirty="0"/>
+            <a:endParaRPr sz="1100" dirty="0"/>
           </a:p>
           <a:p>
             <a:pPr marL="457200" lvl="0" indent="-300037" algn="l" rtl="0">
@@ -16994,10 +17292,10 @@
               <a:buChar char="●"/>
             </a:pPr>
             <a:r>
-              <a:rPr lang="es-419" dirty="0"/>
+              <a:rPr lang="es-419" sz="1100" dirty="0"/>
               <a:t>Operador de asignación (=) es diferente de igualdad(==)</a:t>
             </a:r>
-            <a:endParaRPr dirty="0"/>
+            <a:endParaRPr sz="1100" dirty="0"/>
           </a:p>
           <a:p>
             <a:pPr marL="457200" lvl="0" indent="-300037" algn="l" rtl="0">
@@ -17011,10 +17309,10 @@
               <a:buChar char="●"/>
             </a:pPr>
             <a:r>
-              <a:rPr lang="es-419" dirty="0"/>
+              <a:rPr lang="es-419" sz="1100" dirty="0"/>
               <a:t>Las cadenas de caracteres no pueden compararse:</a:t>
             </a:r>
-            <a:endParaRPr dirty="0"/>
+            <a:endParaRPr sz="1100" dirty="0"/>
           </a:p>
           <a:p>
             <a:pPr marL="914400" lvl="1" indent="-284162" algn="l" rtl="0">
@@ -17028,25 +17326,25 @@
               <a:buChar char="○"/>
             </a:pPr>
             <a:r>
-              <a:rPr lang="es-419" dirty="0" err="1"/>
+              <a:rPr lang="es-419" sz="900" dirty="0" err="1"/>
               <a:t>char</a:t>
             </a:r>
             <a:r>
-              <a:rPr lang="es-419" dirty="0"/>
+              <a:rPr lang="es-419" sz="900" dirty="0"/>
               <a:t> nombre[20];</a:t>
             </a:r>
             <a:br>
-              <a:rPr lang="es-419" dirty="0"/>
+              <a:rPr lang="es-419" sz="900" dirty="0"/>
             </a:br>
             <a:r>
-              <a:rPr lang="es-419" dirty="0" err="1"/>
+              <a:rPr lang="es-419" sz="900" dirty="0" err="1"/>
               <a:t>if</a:t>
             </a:r>
             <a:r>
-              <a:rPr lang="es-419" dirty="0"/>
+              <a:rPr lang="es-419" sz="900" dirty="0"/>
               <a:t>(nombre &gt; “Angelica”)</a:t>
             </a:r>
-            <a:endParaRPr dirty="0"/>
+            <a:endParaRPr sz="900" dirty="0"/>
           </a:p>
           <a:p>
             <a:pPr marL="0" lvl="0" indent="0" algn="l" rtl="0">
@@ -17114,7 +17412,13 @@
         <p:nvGraphicFramePr>
           <p:cNvPr id="203" name="Google Shape;203;p35"/>
           <p:cNvGraphicFramePr/>
-          <p:nvPr/>
+          <p:nvPr>
+            <p:extLst>
+              <p:ext uri="{D42A27DB-BD31-4B8C-83A1-F6EECF244321}">
+                <p14:modId xmlns:p14="http://schemas.microsoft.com/office/powerpoint/2010/main" val="4182424644"/>
+              </p:ext>
+            </p:extLst>
+          </p:nvPr>
         </p:nvGraphicFramePr>
         <p:xfrm>
           <a:off x="787475" y="2302575"/>
@@ -17242,10 +17546,10 @@
                         <a:buNone/>
                       </a:pPr>
                       <a:r>
-                        <a:rPr lang="es-419"/>
+                        <a:rPr lang="es-419" dirty="0"/>
                         <a:t>==</a:t>
                       </a:r>
-                      <a:endParaRPr/>
+                      <a:endParaRPr dirty="0"/>
                     </a:p>
                   </a:txBody>
                   <a:tcPr marL="91425" marR="91425" marT="91425" marB="91425"/>
@@ -17288,10 +17592,10 @@
                         <a:buNone/>
                       </a:pPr>
                       <a:r>
-                        <a:rPr lang="es-419"/>
+                        <a:rPr lang="es-419" dirty="0"/>
                         <a:t>a == b</a:t>
                       </a:r>
-                      <a:endParaRPr/>
+                      <a:endParaRPr dirty="0"/>
                     </a:p>
                   </a:txBody>
                   <a:tcPr marL="91425" marR="91425" marT="91425" marB="91425"/>
@@ -17318,10 +17622,10 @@
                         <a:buNone/>
                       </a:pPr>
                       <a:r>
-                        <a:rPr lang="es-419"/>
+                        <a:rPr lang="es-419" dirty="0"/>
                         <a:t>!=</a:t>
                       </a:r>
-                      <a:endParaRPr/>
+                      <a:endParaRPr dirty="0"/>
                     </a:p>
                   </a:txBody>
                   <a:tcPr marL="91425" marR="91425" marT="91425" marB="91425"/>
@@ -17364,10 +17668,10 @@
                         <a:buNone/>
                       </a:pPr>
                       <a:r>
-                        <a:rPr lang="es-419"/>
+                        <a:rPr lang="es-419" dirty="0"/>
                         <a:t>a != b</a:t>
                       </a:r>
-                      <a:endParaRPr/>
+                      <a:endParaRPr dirty="0"/>
                     </a:p>
                   </a:txBody>
                   <a:tcPr marL="91425" marR="91425" marT="91425" marB="91425"/>
@@ -17440,10 +17744,10 @@
                         <a:buNone/>
                       </a:pPr>
                       <a:r>
-                        <a:rPr lang="es-419"/>
+                        <a:rPr lang="es-419" dirty="0"/>
                         <a:t>a &gt; b</a:t>
                       </a:r>
-                      <a:endParaRPr/>
+                      <a:endParaRPr dirty="0"/>
                     </a:p>
                   </a:txBody>
                   <a:tcPr marL="91425" marR="91425" marT="91425" marB="91425"/>
@@ -17516,10 +17820,10 @@
                         <a:buNone/>
                       </a:pPr>
                       <a:r>
-                        <a:rPr lang="es-419"/>
+                        <a:rPr lang="es-419" dirty="0"/>
                         <a:t>a &lt; b</a:t>
                       </a:r>
-                      <a:endParaRPr/>
+                      <a:endParaRPr dirty="0"/>
                     </a:p>
                   </a:txBody>
                   <a:tcPr marL="91425" marR="91425" marT="91425" marB="91425"/>
@@ -17592,10 +17896,10 @@
                         <a:buNone/>
                       </a:pPr>
                       <a:r>
-                        <a:rPr lang="es-419"/>
+                        <a:rPr lang="es-419" dirty="0"/>
                         <a:t>a &gt;= b</a:t>
                       </a:r>
-                      <a:endParaRPr/>
+                      <a:endParaRPr dirty="0"/>
                     </a:p>
                   </a:txBody>
                   <a:tcPr marL="91425" marR="91425" marT="91425" marB="91425"/>
@@ -17668,10 +17972,10 @@
                         <a:buNone/>
                       </a:pPr>
                       <a:r>
-                        <a:rPr lang="es-419"/>
+                        <a:rPr lang="es-419" dirty="0"/>
                         <a:t>a &lt;= b</a:t>
                       </a:r>
-                      <a:endParaRPr/>
+                      <a:endParaRPr dirty="0"/>
                     </a:p>
                   </a:txBody>
                   <a:tcPr marL="91425" marR="91425" marT="91425" marB="91425"/>
@@ -17998,7 +18302,7 @@
           <p:nvPr>
             <p:extLst>
               <p:ext uri="{D42A27DB-BD31-4B8C-83A1-F6EECF244321}">
-                <p14:modId xmlns:p14="http://schemas.microsoft.com/office/powerpoint/2010/main" val="1409450877"/>
+                <p14:modId xmlns:p14="http://schemas.microsoft.com/office/powerpoint/2010/main" val="4156592231"/>
               </p:ext>
             </p:extLst>
           </p:nvPr>
@@ -18015,14 +18319,14 @@
                 <a:tableStyleId>{11419785-70A5-4291-BBB3-00572DC79438}</a:tableStyleId>
               </a:tblPr>
               <a:tblGrid>
-                <a:gridCol w="2450025">
+                <a:gridCol w="2564181">
                   <a:extLst>
                     <a:ext uri="{9D8B030D-6E8A-4147-A177-3AD203B41FA5}">
                       <a16:colId xmlns:a16="http://schemas.microsoft.com/office/drawing/2014/main" val="20000"/>
                     </a:ext>
                   </a:extLst>
                 </a:gridCol>
-                <a:gridCol w="2450025">
+                <a:gridCol w="2335869">
                   <a:extLst>
                     <a:ext uri="{9D8B030D-6E8A-4147-A177-3AD203B41FA5}">
                       <a16:colId xmlns:a16="http://schemas.microsoft.com/office/drawing/2014/main" val="20001"/>
@@ -18271,7 +18575,7 @@
           <p:nvPr>
             <p:extLst>
               <p:ext uri="{D42A27DB-BD31-4B8C-83A1-F6EECF244321}">
-                <p14:modId xmlns:p14="http://schemas.microsoft.com/office/powerpoint/2010/main" val="2122929820"/>
+                <p14:modId xmlns:p14="http://schemas.microsoft.com/office/powerpoint/2010/main" val="1154125318"/>
               </p:ext>
             </p:extLst>
           </p:nvPr>
@@ -18295,14 +18599,14 @@
                     </a:ext>
                   </a:extLst>
                 </a:gridCol>
-                <a:gridCol w="2513075">
+                <a:gridCol w="2565228">
                   <a:extLst>
                     <a:ext uri="{9D8B030D-6E8A-4147-A177-3AD203B41FA5}">
                       <a16:colId xmlns:a16="http://schemas.microsoft.com/office/drawing/2014/main" val="20001"/>
                     </a:ext>
                   </a:extLst>
                 </a:gridCol>
-                <a:gridCol w="2513075">
+                <a:gridCol w="2460922">
                   <a:extLst>
                     <a:ext uri="{9D8B030D-6E8A-4147-A177-3AD203B41FA5}">
                       <a16:colId xmlns:a16="http://schemas.microsoft.com/office/drawing/2014/main" val="20002"/>
@@ -18809,14 +19113,14 @@
               <a:buNone/>
             </a:pPr>
             <a:r>
-              <a:rPr lang="es-419"/>
+              <a:rPr lang="es-419" dirty="0"/>
               <a:t>Tabla de verdad del operador lógico </a:t>
             </a:r>
             <a:r>
-              <a:rPr lang="es-419" b="1"/>
+              <a:rPr lang="es-419" b="1" dirty="0"/>
               <a:t>OR(||)</a:t>
             </a:r>
-            <a:endParaRPr b="1"/>
+            <a:endParaRPr b="1" dirty="0"/>
           </a:p>
         </p:txBody>
       </p:sp>
@@ -20141,18 +20445,18 @@
               <a:buAutoNum type="arabicPeriod"/>
             </a:pPr>
             <a:r>
-              <a:rPr lang="es-419"/>
+              <a:rPr lang="es-419" dirty="0"/>
               <a:t>Preprocesador (</a:t>
             </a:r>
             <a:r>
-              <a:rPr lang="es-419" i="1"/>
+              <a:rPr lang="es-419" i="1" dirty="0" err="1"/>
               <a:t>preprocessing</a:t>
             </a:r>
             <a:r>
-              <a:rPr lang="es-419"/>
+              <a:rPr lang="es-419" dirty="0"/>
               <a:t>)</a:t>
             </a:r>
-            <a:endParaRPr/>
+            <a:endParaRPr dirty="0"/>
           </a:p>
           <a:p>
             <a:pPr marL="914400" lvl="1" indent="-304165" algn="l" rtl="0">
@@ -20166,26 +20470,26 @@
               <a:buAutoNum type="alphaLcPeriod"/>
             </a:pPr>
             <a:r>
-              <a:rPr lang="es-419"/>
+              <a:rPr lang="es-419" dirty="0"/>
               <a:t>Antes de que un programa en C++ sea compilado, el código fuente es preprocesador por el compilador. Este método no es parte del compilador, es un método separado que se corre antes del proceso de compilación, donde a través de las directivas al preprocesador, como </a:t>
             </a:r>
             <a:r>
-              <a:rPr lang="es-419" i="1"/>
+              <a:rPr lang="es-419" i="1" dirty="0"/>
               <a:t>#include </a:t>
             </a:r>
             <a:r>
-              <a:rPr lang="es-419"/>
+              <a:rPr lang="es-419" dirty="0"/>
               <a:t>y</a:t>
             </a:r>
             <a:r>
-              <a:rPr lang="es-419" i="1"/>
+              <a:rPr lang="es-419" i="1" dirty="0"/>
               <a:t> #define</a:t>
             </a:r>
             <a:r>
-              <a:rPr lang="es-419"/>
+              <a:rPr lang="es-419" dirty="0"/>
               <a:t>, se procesan los archivos de cabecera, instrucciones condicionales de compilación y macros contenidos en el código fuente, los cuales expande en un solo código fuente de mayor tamaño.</a:t>
             </a:r>
-            <a:endParaRPr/>
+            <a:endParaRPr dirty="0"/>
           </a:p>
           <a:p>
             <a:pPr marL="457200" lvl="0" indent="-325755" algn="l" rtl="0">
@@ -20199,18 +20503,18 @@
               <a:buAutoNum type="arabicPeriod"/>
             </a:pPr>
             <a:r>
-              <a:rPr lang="es-419"/>
+              <a:rPr lang="es-419" dirty="0"/>
               <a:t>Compilación (</a:t>
             </a:r>
             <a:r>
-              <a:rPr lang="es-419" i="1"/>
+              <a:rPr lang="es-419" i="1" dirty="0" err="1"/>
               <a:t>compilation</a:t>
             </a:r>
             <a:r>
-              <a:rPr lang="es-419"/>
+              <a:rPr lang="es-419" dirty="0"/>
               <a:t>)</a:t>
             </a:r>
-            <a:endParaRPr i="1"/>
+            <a:endParaRPr i="1" dirty="0"/>
           </a:p>
           <a:p>
             <a:pPr marL="914400" lvl="1" indent="-304165" algn="l" rtl="0">
@@ -20224,10 +20528,10 @@
               <a:buAutoNum type="alphaLcPeriod"/>
             </a:pPr>
             <a:r>
-              <a:rPr lang="es-419"/>
+              <a:rPr lang="es-419" dirty="0"/>
               <a:t>Convierte con el output del preprocesador (código C++ puro, sin directivas de preprocesador) en código ensamblador.</a:t>
             </a:r>
-            <a:endParaRPr/>
+            <a:endParaRPr dirty="0"/>
           </a:p>
           <a:p>
             <a:pPr marL="914400" lvl="1" indent="-304165" algn="l" rtl="0">
@@ -20241,10 +20545,10 @@
               <a:buAutoNum type="alphaLcPeriod"/>
             </a:pPr>
             <a:r>
-              <a:rPr lang="es-419"/>
+              <a:rPr lang="es-419" dirty="0"/>
               <a:t>Es en esta fase donde son los errores de compilación son reportados, como errores de sintaxis, etc.</a:t>
             </a:r>
-            <a:endParaRPr/>
+            <a:endParaRPr dirty="0"/>
           </a:p>
           <a:p>
             <a:pPr marL="457200" lvl="0" indent="-325755" algn="l" rtl="0">
@@ -20258,10 +20562,10 @@
               <a:buAutoNum type="arabicPeriod"/>
             </a:pPr>
             <a:r>
-              <a:rPr lang="es-419"/>
+              <a:rPr lang="es-419" dirty="0" err="1"/>
               <a:t>Assembly</a:t>
             </a:r>
-            <a:endParaRPr/>
+            <a:endParaRPr dirty="0"/>
           </a:p>
           <a:p>
             <a:pPr marL="914400" lvl="1" indent="-304165" algn="l" rtl="0">
@@ -20275,10 +20579,18 @@
               <a:buAutoNum type="alphaLcPeriod"/>
             </a:pPr>
             <a:r>
-              <a:rPr lang="es-419"/>
-              <a:t>Convierte el código ensamblador generado en la compilación y produce archivos binarios con código máquina (object files).</a:t>
-            </a:r>
-            <a:endParaRPr/>
+              <a:rPr lang="es-419" dirty="0"/>
+              <a:t>Convierte el código ensamblador generado en la compilación y produce archivos binarios con código máquina (</a:t>
+            </a:r>
+            <a:r>
+              <a:rPr lang="es-419" dirty="0" err="1"/>
+              <a:t>object</a:t>
+            </a:r>
+            <a:r>
+              <a:rPr lang="es-419" dirty="0"/>
+              <a:t> files).</a:t>
+            </a:r>
+            <a:endParaRPr dirty="0"/>
           </a:p>
           <a:p>
             <a:pPr marL="457200" lvl="0" indent="-325755" algn="l" rtl="0">
@@ -20292,18 +20604,18 @@
               <a:buAutoNum type="arabicPeriod"/>
             </a:pPr>
             <a:r>
-              <a:rPr lang="es-419"/>
+              <a:rPr lang="es-419" dirty="0"/>
               <a:t>Enlazado (</a:t>
             </a:r>
             <a:r>
-              <a:rPr lang="es-419" i="1"/>
+              <a:rPr lang="es-419" i="1" dirty="0" err="1"/>
               <a:t>linking</a:t>
             </a:r>
             <a:r>
-              <a:rPr lang="es-419"/>
+              <a:rPr lang="es-419" dirty="0"/>
               <a:t>)</a:t>
             </a:r>
-            <a:endParaRPr/>
+            <a:endParaRPr dirty="0"/>
           </a:p>
           <a:p>
             <a:pPr marL="914400" lvl="1" indent="-304165" algn="l" rtl="0">
@@ -20317,10 +20629,18 @@
               <a:buAutoNum type="alphaLcPeriod"/>
             </a:pPr>
             <a:r>
-              <a:rPr lang="es-419"/>
-              <a:t>Enlaza uno o más object files y los combina para producir un solo archivo (generalmente un ejecutable).</a:t>
-            </a:r>
-            <a:endParaRPr/>
+              <a:rPr lang="es-419" dirty="0"/>
+              <a:t>Enlaza uno o más </a:t>
+            </a:r>
+            <a:r>
+              <a:rPr lang="es-419" dirty="0" err="1"/>
+              <a:t>object</a:t>
+            </a:r>
+            <a:r>
+              <a:rPr lang="es-419" dirty="0"/>
+              <a:t> files y los combina para producir un solo archivo (generalmente un ejecutable).</a:t>
+            </a:r>
+            <a:endParaRPr dirty="0"/>
           </a:p>
           <a:p>
             <a:pPr marL="914400" lvl="1" indent="-304165" algn="l" rtl="0">
@@ -20334,10 +20654,10 @@
               <a:buAutoNum type="alphaLcPeriod"/>
             </a:pPr>
             <a:r>
-              <a:rPr lang="es-419"/>
+              <a:rPr lang="es-419" dirty="0"/>
               <a:t>En esta etapa se reportan los errores de definiciones duplicadas, dependencias no encontradas, etc.</a:t>
             </a:r>
-            <a:endParaRPr/>
+            <a:endParaRPr dirty="0"/>
           </a:p>
         </p:txBody>
       </p:sp>
@@ -21241,7 +21561,7 @@
           <p:nvPr>
             <p:extLst>
               <p:ext uri="{D42A27DB-BD31-4B8C-83A1-F6EECF244321}">
-                <p14:modId xmlns:p14="http://schemas.microsoft.com/office/powerpoint/2010/main" val="1254956526"/>
+                <p14:modId xmlns:p14="http://schemas.microsoft.com/office/powerpoint/2010/main" val="3967244788"/>
               </p:ext>
             </p:extLst>
           </p:nvPr>
@@ -21258,14 +21578,14 @@
                 <a:tableStyleId>{11419785-70A5-4291-BBB3-00572DC79438}</a:tableStyleId>
               </a:tblPr>
               <a:tblGrid>
-                <a:gridCol w="1276483">
+                <a:gridCol w="1380535">
                   <a:extLst>
                     <a:ext uri="{9D8B030D-6E8A-4147-A177-3AD203B41FA5}">
                       <a16:colId xmlns:a16="http://schemas.microsoft.com/office/drawing/2014/main" val="20000"/>
                     </a:ext>
                   </a:extLst>
                 </a:gridCol>
-                <a:gridCol w="2452042">
+                <a:gridCol w="2347990">
                   <a:extLst>
                     <a:ext uri="{9D8B030D-6E8A-4147-A177-3AD203B41FA5}">
                       <a16:colId xmlns:a16="http://schemas.microsoft.com/office/drawing/2014/main" val="20001"/>
@@ -21657,10 +21977,10 @@
                         <a:buNone/>
                       </a:pPr>
                       <a:r>
-                        <a:rPr lang="es-419" sz="1200" b="1"/>
+                        <a:rPr lang="es-419" sz="1200" b="1" dirty="0"/>
                         <a:t>IZQ-DER</a:t>
                       </a:r>
-                      <a:endParaRPr sz="1200" b="1"/>
+                      <a:endParaRPr sz="1200" b="1" dirty="0"/>
                     </a:p>
                   </a:txBody>
                   <a:tcPr marL="91425" marR="91425" marT="36000" marB="36000"/>
@@ -21791,10 +22111,10 @@
                         <a:buNone/>
                       </a:pPr>
                       <a:r>
-                        <a:rPr lang="es-419" sz="1200" b="1"/>
+                        <a:rPr lang="es-419" sz="1200" b="1" dirty="0"/>
                         <a:t>&lt;  &lt;=  &gt;  &gt;=</a:t>
                       </a:r>
-                      <a:endParaRPr sz="1200" b="1"/>
+                      <a:endParaRPr sz="1200" b="1" dirty="0"/>
                     </a:p>
                   </a:txBody>
                   <a:tcPr marL="91425" marR="91425" marT="36000" marB="36000"/>
@@ -21872,10 +22192,10 @@
                         <a:buNone/>
                       </a:pPr>
                       <a:r>
-                        <a:rPr lang="es-419" sz="1200" b="1"/>
+                        <a:rPr lang="es-419" sz="1200" b="1" dirty="0"/>
                         <a:t>==  !=</a:t>
                       </a:r>
-                      <a:endParaRPr sz="1200" b="1"/>
+                      <a:endParaRPr sz="1200" b="1" dirty="0"/>
                     </a:p>
                   </a:txBody>
                   <a:tcPr marL="91425" marR="91425" marT="36000" marB="36000"/>
@@ -22434,10 +22754,10 @@
                         <a:buNone/>
                       </a:pPr>
                       <a:r>
-                        <a:rPr lang="es-419" sz="1200" b="1"/>
+                        <a:rPr lang="es-419" sz="1200" b="1" dirty="0"/>
                         <a:t>= += -= *= /= %= </a:t>
                       </a:r>
-                      <a:endParaRPr sz="1200" b="1"/>
+                      <a:endParaRPr sz="1200" b="1" dirty="0"/>
                     </a:p>
                   </a:txBody>
                   <a:tcPr marL="91425" marR="91425" marT="36000" marB="36000"/>
@@ -23324,10 +23644,26 @@
               <a:buChar char="●"/>
             </a:pPr>
             <a:r>
-              <a:rPr lang="es-419"/>
-              <a:t>Una sentencia if es anidada cuando la sentencia de la rama verdadera o de la rama falsa, es a su vez un if.</a:t>
-            </a:r>
-            <a:endParaRPr/>
+              <a:rPr lang="es-419" dirty="0"/>
+              <a:t>Una sentencia </a:t>
+            </a:r>
+            <a:r>
+              <a:rPr lang="es-419" dirty="0" err="1"/>
+              <a:t>if</a:t>
+            </a:r>
+            <a:r>
+              <a:rPr lang="es-419" dirty="0"/>
+              <a:t> es anidada cuando la sentencia de la rama verdadera o de la rama falsa, es a su vez un </a:t>
+            </a:r>
+            <a:r>
+              <a:rPr lang="es-419" dirty="0" err="1"/>
+              <a:t>if</a:t>
+            </a:r>
+            <a:r>
+              <a:rPr lang="es-419" dirty="0"/>
+              <a:t>.</a:t>
+            </a:r>
+            <a:endParaRPr dirty="0"/>
           </a:p>
           <a:p>
             <a:pPr marL="457200" lvl="0" indent="-342900" algn="l" rtl="0">
@@ -23341,10 +23677,10 @@
               <a:buChar char="●"/>
             </a:pPr>
             <a:r>
-              <a:rPr lang="es-419"/>
+              <a:rPr lang="es-419" dirty="0"/>
               <a:t>La sintaxis es la siguiente:</a:t>
             </a:r>
-            <a:endParaRPr/>
+            <a:endParaRPr dirty="0"/>
           </a:p>
           <a:p>
             <a:pPr marL="1371600" lvl="0" indent="0" algn="l" rtl="0">
@@ -23357,10 +23693,14 @@
               <a:buNone/>
             </a:pPr>
             <a:r>
-              <a:rPr lang="es-419"/>
-              <a:t>if(condicion1) sentencia1;</a:t>
-            </a:r>
-            <a:endParaRPr/>
+              <a:rPr lang="es-419" dirty="0" err="1"/>
+              <a:t>if</a:t>
+            </a:r>
+            <a:r>
+              <a:rPr lang="es-419" dirty="0"/>
+              <a:t>(condicion1) sentencia1;</a:t>
+            </a:r>
+            <a:endParaRPr dirty="0"/>
           </a:p>
           <a:p>
             <a:pPr marL="1371600" lvl="0" indent="0" algn="l" rtl="0">
@@ -23373,10 +23713,22 @@
               <a:buNone/>
             </a:pPr>
             <a:r>
-              <a:rPr lang="es-419"/>
-              <a:t>else if(condicion2) sentencia2;</a:t>
-            </a:r>
-            <a:endParaRPr/>
+              <a:rPr lang="es-419" dirty="0" err="1"/>
+              <a:t>else</a:t>
+            </a:r>
+            <a:r>
+              <a:rPr lang="es-419" dirty="0"/>
+              <a:t> </a:t>
+            </a:r>
+            <a:r>
+              <a:rPr lang="es-419" dirty="0" err="1"/>
+              <a:t>if</a:t>
+            </a:r>
+            <a:r>
+              <a:rPr lang="es-419" dirty="0"/>
+              <a:t>(condicion2) sentencia2;</a:t>
+            </a:r>
+            <a:endParaRPr dirty="0"/>
           </a:p>
           <a:p>
             <a:pPr marL="1371600" lvl="0" indent="0" algn="l" rtl="0">
@@ -23389,10 +23741,10 @@
               <a:buNone/>
             </a:pPr>
             <a:r>
-              <a:rPr lang="es-419"/>
+              <a:rPr lang="es-419" dirty="0"/>
               <a:t>…</a:t>
             </a:r>
-            <a:endParaRPr/>
+            <a:endParaRPr dirty="0"/>
           </a:p>
           <a:p>
             <a:pPr marL="1371600" lvl="0" indent="0" algn="l" rtl="0">
@@ -23405,10 +23757,22 @@
               <a:buNone/>
             </a:pPr>
             <a:r>
-              <a:rPr lang="es-419"/>
-              <a:t>else sentencia_n;</a:t>
-            </a:r>
-            <a:endParaRPr/>
+              <a:rPr lang="es-419" dirty="0" err="1"/>
+              <a:t>else</a:t>
+            </a:r>
+            <a:r>
+              <a:rPr lang="es-419" dirty="0"/>
+              <a:t> </a:t>
+            </a:r>
+            <a:r>
+              <a:rPr lang="es-419" dirty="0" err="1"/>
+              <a:t>sentencia_n</a:t>
+            </a:r>
+            <a:r>
+              <a:rPr lang="es-419" dirty="0"/>
+              <a:t>;</a:t>
+            </a:r>
+            <a:endParaRPr dirty="0"/>
           </a:p>
           <a:p>
             <a:pPr marL="1371600" lvl="0" indent="0" algn="l" rtl="0">
@@ -23421,10 +23785,10 @@
               <a:buNone/>
             </a:pPr>
             <a:r>
-              <a:rPr lang="es-419"/>
+              <a:rPr lang="es-419" dirty="0"/>
               <a:t>	</a:t>
             </a:r>
-            <a:endParaRPr/>
+            <a:endParaRPr dirty="0"/>
           </a:p>
         </p:txBody>
       </p:sp>
@@ -24234,7 +24598,6 @@
               <a:rPr lang="es-419" dirty="0"/>
               <a:t>}</a:t>
             </a:r>
-            <a:endParaRPr dirty="0"/>
           </a:p>
         </p:txBody>
       </p:sp>
@@ -26896,10 +27259,10 @@
               <a:buNone/>
             </a:pPr>
             <a:r>
-              <a:rPr lang="es-419"/>
+              <a:rPr lang="es-419" dirty="0"/>
               <a:t>Directivas del preprocesador</a:t>
             </a:r>
-            <a:endParaRPr/>
+            <a:endParaRPr dirty="0"/>
           </a:p>
         </p:txBody>
       </p:sp>
@@ -26939,10 +27302,10 @@
               <a:buChar char="●"/>
             </a:pPr>
             <a:r>
-              <a:rPr lang="es-419"/>
+              <a:rPr lang="es-419" dirty="0"/>
               <a:t>Las directivas son instrucciones al compilador antes de que se compile el programa.</a:t>
             </a:r>
-            <a:endParaRPr/>
+            <a:endParaRPr dirty="0"/>
           </a:p>
           <a:p>
             <a:pPr marL="457200" lvl="0" indent="-342900" algn="l" rtl="0">
@@ -26956,18 +27319,18 @@
               <a:buChar char="●"/>
             </a:pPr>
             <a:r>
-              <a:rPr lang="es-419"/>
+              <a:rPr lang="es-419" dirty="0"/>
               <a:t>Todas las directivas empiezan con </a:t>
             </a:r>
             <a:r>
-              <a:rPr lang="es-419" b="1" u="sng"/>
+              <a:rPr lang="es-419" b="1" u="sng" dirty="0"/>
               <a:t>#</a:t>
             </a:r>
             <a:r>
-              <a:rPr lang="es-419"/>
+              <a:rPr lang="es-419" dirty="0"/>
               <a:t>.</a:t>
             </a:r>
-            <a:endParaRPr/>
+            <a:endParaRPr dirty="0"/>
           </a:p>
           <a:p>
             <a:pPr marL="457200" lvl="0" indent="-342900" algn="l" rtl="0">
@@ -26981,30 +27344,30 @@
               <a:buChar char="●"/>
             </a:pPr>
             <a:r>
-              <a:rPr lang="es-419"/>
+              <a:rPr lang="es-419" dirty="0"/>
               <a:t>Las dos directivas más comunes son </a:t>
             </a:r>
             <a:r>
-              <a:rPr lang="es-419" b="1" i="1"/>
+              <a:rPr lang="es-419" b="1" i="1" dirty="0"/>
               <a:t>#include</a:t>
             </a:r>
             <a:r>
-              <a:rPr lang="es-419" i="1"/>
+              <a:rPr lang="es-419" i="1" dirty="0"/>
               <a:t> </a:t>
             </a:r>
             <a:r>
-              <a:rPr lang="es-419"/>
+              <a:rPr lang="es-419" dirty="0"/>
               <a:t>y </a:t>
             </a:r>
             <a:r>
-              <a:rPr lang="es-419" b="1" i="1"/>
+              <a:rPr lang="es-419" b="1" i="1" dirty="0"/>
               <a:t>#define</a:t>
             </a:r>
             <a:r>
-              <a:rPr lang="es-419"/>
+              <a:rPr lang="es-419" dirty="0"/>
               <a:t>.</a:t>
             </a:r>
-            <a:endParaRPr/>
+            <a:endParaRPr dirty="0"/>
           </a:p>
           <a:p>
             <a:pPr marL="914400" lvl="1" indent="-317500" algn="l" rtl="0">
@@ -27018,10 +27381,18 @@
               <a:buChar char="○"/>
             </a:pPr>
             <a:r>
-              <a:rPr lang="es-419"/>
-              <a:t>#include: indica al compilador que lea el archivo fuente que viene a continuación, estos archivos se denominan archivos de cabecera (header files)</a:t>
-            </a:r>
-            <a:endParaRPr/>
+              <a:rPr lang="es-419" dirty="0"/>
+              <a:t>#include: indica al compilador que lea el archivo fuente que viene a continuación, estos archivos se denominan archivos de cabecera (</a:t>
+            </a:r>
+            <a:r>
+              <a:rPr lang="es-419" dirty="0" err="1"/>
+              <a:t>header</a:t>
+            </a:r>
+            <a:r>
+              <a:rPr lang="es-419" dirty="0"/>
+              <a:t> files)</a:t>
+            </a:r>
+            <a:endParaRPr dirty="0"/>
           </a:p>
           <a:p>
             <a:pPr marL="1371600" lvl="2" indent="-317500" algn="l" rtl="0">
@@ -27035,14 +27406,14 @@
               <a:buChar char="■"/>
             </a:pPr>
             <a:r>
-              <a:rPr lang="es-419"/>
+              <a:rPr lang="es-419" dirty="0"/>
               <a:t>#include&lt;headerFile.h&gt;: El archivo se encuentra en el directorio por defecto </a:t>
             </a:r>
             <a:r>
-              <a:rPr lang="es-419" i="1"/>
+              <a:rPr lang="es-419" i="1" dirty="0" err="1"/>
               <a:t>include</a:t>
             </a:r>
-            <a:endParaRPr i="1"/>
+            <a:endParaRPr i="1" dirty="0"/>
           </a:p>
           <a:p>
             <a:pPr marL="1371600" lvl="2" indent="-317500" algn="l" rtl="0">
@@ -27056,10 +27427,18 @@
               <a:buChar char="■"/>
             </a:pPr>
             <a:r>
-              <a:rPr lang="es-419"/>
-              <a:t>#include “headerFile.h”: El archivo se encuentra en el directorio actual</a:t>
-            </a:r>
-            <a:endParaRPr/>
+              <a:rPr lang="es-419" dirty="0"/>
+              <a:t>#include “</a:t>
+            </a:r>
+            <a:r>
+              <a:rPr lang="es-419" dirty="0" err="1"/>
+              <a:t>headerFile.h</a:t>
+            </a:r>
+            <a:r>
+              <a:rPr lang="es-419" dirty="0"/>
+              <a:t>”: El archivo se encuentra en el directorio actual</a:t>
+            </a:r>
+            <a:endParaRPr dirty="0"/>
           </a:p>
           <a:p>
             <a:pPr marL="457200" lvl="0" indent="-342900" algn="l" rtl="0">
@@ -27073,18 +27452,18 @@
               <a:buChar char="●"/>
             </a:pPr>
             <a:r>
-              <a:rPr lang="es-419"/>
+              <a:rPr lang="es-419" dirty="0"/>
               <a:t>La directiva </a:t>
             </a:r>
             <a:r>
-              <a:rPr lang="es-419" b="1" i="1"/>
+              <a:rPr lang="es-419" b="1" i="1" dirty="0"/>
               <a:t>#define </a:t>
             </a:r>
             <a:r>
-              <a:rPr lang="es-419"/>
+              <a:rPr lang="es-419" dirty="0"/>
               <a:t>indica al preprocesador que defina un ítem de datos u operación para el programa:</a:t>
             </a:r>
-            <a:endParaRPr/>
+            <a:endParaRPr dirty="0"/>
           </a:p>
           <a:p>
             <a:pPr marL="914400" lvl="1" indent="-317500" algn="l" rtl="0">
@@ -27098,10 +27477,10 @@
               <a:buChar char="○"/>
             </a:pPr>
             <a:r>
-              <a:rPr lang="es-419"/>
+              <a:rPr lang="es-419" dirty="0"/>
               <a:t>#define MAX_LENGTH 255</a:t>
             </a:r>
-            <a:endParaRPr/>
+            <a:endParaRPr dirty="0"/>
           </a:p>
           <a:p>
             <a:pPr marL="914400" lvl="1" indent="-317500" algn="l" rtl="0">
@@ -27115,10 +27494,18 @@
               <a:buChar char="○"/>
             </a:pPr>
             <a:r>
-              <a:rPr lang="es-419"/>
-              <a:t>#define Area(base, altura) (base * altura)</a:t>
-            </a:r>
-            <a:endParaRPr/>
+              <a:rPr lang="es-419" dirty="0"/>
+              <a:t>#define </a:t>
+            </a:r>
+            <a:r>
+              <a:rPr lang="es-419" dirty="0" err="1"/>
+              <a:t>Area</a:t>
+            </a:r>
+            <a:r>
+              <a:rPr lang="es-419" dirty="0"/>
+              <a:t>(base, altura) (base * altura)</a:t>
+            </a:r>
+            <a:endParaRPr dirty="0"/>
           </a:p>
         </p:txBody>
       </p:sp>
@@ -28767,7 +29154,7 @@
             </a:pPr>
             <a:r>
               <a:rPr lang="es-419" dirty="0"/>
-              <a:t>Los elementos del arreglo se llaman elementos del arreglo</a:t>
+              <a:t>Cada uno de los datos arreglo se llaman elementos del arreglo</a:t>
             </a:r>
             <a:endParaRPr dirty="0"/>
           </a:p>
@@ -28983,10 +29370,10 @@
               <a:buChar char="●"/>
             </a:pPr>
             <a:r>
-              <a:rPr lang="es-419"/>
+              <a:rPr lang="es-419" dirty="0"/>
               <a:t>Indican al compilador que las funciones o variables definidas por el usuario son comunes a todas las funciones del programa.</a:t>
             </a:r>
-            <a:endParaRPr/>
+            <a:endParaRPr dirty="0"/>
           </a:p>
           <a:p>
             <a:pPr marL="457200" lvl="0" indent="-342900" algn="l" rtl="0">
@@ -29000,18 +29387,22 @@
               <a:buChar char="●"/>
             </a:pPr>
             <a:r>
-              <a:rPr lang="es-419"/>
+              <a:rPr lang="es-419" dirty="0"/>
               <a:t>Se sitúan antes de la función </a:t>
             </a:r>
             <a:r>
-              <a:rPr lang="es-419" i="1"/>
-              <a:t>main()</a:t>
-            </a:r>
-            <a:r>
-              <a:rPr lang="es-419"/>
+              <a:rPr lang="es-419" i="1" dirty="0" err="1"/>
+              <a:t>main</a:t>
+            </a:r>
+            <a:r>
+              <a:rPr lang="es-419" i="1" dirty="0"/>
+              <a:t>()</a:t>
+            </a:r>
+            <a:r>
+              <a:rPr lang="es-419" dirty="0"/>
               <a:t>.</a:t>
             </a:r>
-            <a:endParaRPr/>
+            <a:endParaRPr dirty="0"/>
           </a:p>
           <a:p>
             <a:pPr marL="457200" lvl="0" indent="-342900" algn="l" rtl="0">
@@ -29025,18 +29416,18 @@
               <a:buChar char="●"/>
             </a:pPr>
             <a:r>
-              <a:rPr lang="es-419"/>
+              <a:rPr lang="es-419" dirty="0"/>
               <a:t>Las declaraciones de función se denominan </a:t>
             </a:r>
             <a:r>
-              <a:rPr lang="es-419" i="1"/>
+              <a:rPr lang="es-419" i="1" dirty="0"/>
               <a:t>prototipos</a:t>
             </a:r>
             <a:r>
-              <a:rPr lang="es-419"/>
+              <a:rPr lang="es-419" dirty="0"/>
               <a:t>.</a:t>
             </a:r>
-            <a:endParaRPr/>
+            <a:endParaRPr dirty="0"/>
           </a:p>
         </p:txBody>
       </p:sp>
@@ -29143,18 +29534,22 @@
               <a:buChar char="●"/>
             </a:pPr>
             <a:r>
-              <a:rPr lang="es-419"/>
+              <a:rPr lang="es-419" dirty="0"/>
               <a:t>Cada programa tiene una función </a:t>
             </a:r>
             <a:r>
-              <a:rPr lang="es-419" i="1"/>
-              <a:t>main()</a:t>
-            </a:r>
-            <a:r>
-              <a:rPr lang="es-419"/>
+              <a:rPr lang="es-419" i="1" dirty="0" err="1"/>
+              <a:t>main</a:t>
+            </a:r>
+            <a:r>
+              <a:rPr lang="es-419" i="1" dirty="0"/>
+              <a:t>()</a:t>
+            </a:r>
+            <a:r>
+              <a:rPr lang="es-419" dirty="0"/>
               <a:t> que es el punto de entrada al mismo.</a:t>
             </a:r>
-            <a:endParaRPr/>
+            <a:endParaRPr dirty="0"/>
           </a:p>
           <a:p>
             <a:pPr marL="457200" lvl="0" indent="-334327" algn="l" rtl="0">
@@ -29168,10 +29563,18 @@
               <a:buChar char="●"/>
             </a:pPr>
             <a:r>
-              <a:rPr lang="es-419"/>
-              <a:t>Solo puede haber una función main por programa.</a:t>
-            </a:r>
-            <a:endParaRPr/>
+              <a:rPr lang="es-419" dirty="0"/>
+              <a:t>Solo puede haber una función </a:t>
+            </a:r>
+            <a:r>
+              <a:rPr lang="es-419" dirty="0" err="1"/>
+              <a:t>main</a:t>
+            </a:r>
+            <a:r>
+              <a:rPr lang="es-419" dirty="0"/>
+              <a:t> por programa.</a:t>
+            </a:r>
+            <a:endParaRPr dirty="0"/>
           </a:p>
           <a:p>
             <a:pPr marL="457200" lvl="0" indent="-334327" algn="l" rtl="0">
@@ -29185,10 +29588,10 @@
               <a:buChar char="●"/>
             </a:pPr>
             <a:r>
-              <a:rPr lang="es-419"/>
+              <a:rPr lang="es-419" dirty="0"/>
               <a:t>Un programa es una colección de funciones.</a:t>
             </a:r>
-            <a:endParaRPr/>
+            <a:endParaRPr dirty="0"/>
           </a:p>
           <a:p>
             <a:pPr marL="457200" lvl="0" indent="-334327" algn="l" rtl="0">
@@ -29202,10 +29605,10 @@
               <a:buChar char="●"/>
             </a:pPr>
             <a:r>
-              <a:rPr lang="es-419"/>
+              <a:rPr lang="es-419" dirty="0"/>
               <a:t>Una función es un segmento de código que realiza una rutina en específico.</a:t>
             </a:r>
-            <a:endParaRPr/>
+            <a:endParaRPr dirty="0"/>
           </a:p>
           <a:p>
             <a:pPr marL="457200" lvl="0" indent="-334327" algn="l" rtl="0">
@@ -29219,10 +29622,10 @@
               <a:buChar char="●"/>
             </a:pPr>
             <a:r>
-              <a:rPr lang="es-419"/>
+              <a:rPr lang="es-419" dirty="0"/>
               <a:t>Su estructura es la siguiente:</a:t>
             </a:r>
-            <a:endParaRPr/>
+            <a:endParaRPr dirty="0"/>
           </a:p>
           <a:p>
             <a:pPr marL="914400" lvl="1" indent="-310832" algn="l" rtl="0">
@@ -29236,31 +29639,55 @@
               <a:buChar char="○"/>
             </a:pPr>
             <a:r>
-              <a:rPr lang="es-419"/>
-              <a:t>tipo_retorno nombre_funcion(lista_de_parametros){ </a:t>
+              <a:rPr lang="es-419" dirty="0" err="1"/>
+              <a:t>tipo_retorno</a:t>
+            </a:r>
+            <a:r>
+              <a:rPr lang="es-419" dirty="0"/>
+              <a:t> </a:t>
+            </a:r>
+            <a:r>
+              <a:rPr lang="es-419" dirty="0" err="1"/>
+              <a:t>nombre_funcion</a:t>
+            </a:r>
+            <a:r>
+              <a:rPr lang="es-419" dirty="0"/>
+              <a:t>(</a:t>
+            </a:r>
+            <a:r>
+              <a:rPr lang="es-419" dirty="0" err="1"/>
+              <a:t>lista_de_parametros</a:t>
+            </a:r>
+            <a:r>
+              <a:rPr lang="es-419" dirty="0"/>
+              <a:t>){ </a:t>
             </a:r>
             <a:br>
-              <a:rPr lang="es-419"/>
+              <a:rPr lang="es-419" dirty="0"/>
             </a:br>
             <a:r>
-              <a:rPr lang="es-419"/>
+              <a:rPr lang="es-419" dirty="0"/>
               <a:t>sentencias… </a:t>
             </a:r>
             <a:br>
-              <a:rPr lang="es-419"/>
+              <a:rPr lang="es-419" dirty="0"/>
             </a:br>
             <a:r>
-              <a:rPr lang="es-419"/>
-              <a:t>return </a:t>
+              <a:rPr lang="es-419" dirty="0" err="1"/>
+              <a:t>return</a:t>
+            </a:r>
+            <a:r>
+              <a:rPr lang="es-419" dirty="0"/>
+              <a:t> </a:t>
             </a:r>
             <a:br>
-              <a:rPr lang="es-419"/>
+              <a:rPr lang="es-419" dirty="0"/>
             </a:br>
             <a:r>
-              <a:rPr lang="es-419"/>
+              <a:rPr lang="es-419" dirty="0"/>
               <a:t>}</a:t>
             </a:r>
-            <a:endParaRPr/>
+            <a:endParaRPr dirty="0"/>
           </a:p>
           <a:p>
             <a:pPr marL="457200" lvl="0" indent="-334327" algn="l" rtl="0">
@@ -29274,10 +29701,26 @@
               <a:buChar char="●"/>
             </a:pPr>
             <a:r>
-              <a:rPr lang="es-419"/>
-              <a:t>Para usar una función que se encuentra después de la definición de la función main(), es necesario declarar el prototipo de la función a usar antes del main().</a:t>
-            </a:r>
-            <a:endParaRPr/>
+              <a:rPr lang="es-419" dirty="0"/>
+              <a:t>Para usar una función que se encuentra después de la definición de la función </a:t>
+            </a:r>
+            <a:r>
+              <a:rPr lang="es-419" dirty="0" err="1"/>
+              <a:t>main</a:t>
+            </a:r>
+            <a:r>
+              <a:rPr lang="es-419" dirty="0"/>
+              <a:t>(), es necesario declarar el prototipo de la función a usar antes del </a:t>
+            </a:r>
+            <a:r>
+              <a:rPr lang="es-419" dirty="0" err="1"/>
+              <a:t>main</a:t>
+            </a:r>
+            <a:r>
+              <a:rPr lang="es-419" dirty="0"/>
+              <a:t>().</a:t>
+            </a:r>
+            <a:endParaRPr dirty="0"/>
           </a:p>
           <a:p>
             <a:pPr marL="457200" lvl="0" indent="-334327" algn="l" rtl="0">
@@ -29291,10 +29734,10 @@
               <a:buChar char="●"/>
             </a:pPr>
             <a:r>
-              <a:rPr lang="es-419"/>
+              <a:rPr lang="es-419" dirty="0"/>
               <a:t>Existen diversas bibliotecas de funciones que vienen con el lenguaje.</a:t>
             </a:r>
-            <a:endParaRPr/>
+            <a:endParaRPr dirty="0"/>
           </a:p>
         </p:txBody>
       </p:sp>
@@ -29401,10 +29844,10 @@
               <a:buChar char="●"/>
             </a:pPr>
             <a:r>
-              <a:rPr lang="es-419"/>
+              <a:rPr lang="es-419" dirty="0"/>
               <a:t>Los comentarios son cualquier información que se añade al archivo de código fuente para proporcionar documentación sobre cualquier tipo.</a:t>
             </a:r>
-            <a:endParaRPr/>
+            <a:endParaRPr dirty="0"/>
           </a:p>
           <a:p>
             <a:pPr marL="457200" lvl="0" indent="-342900" algn="l" rtl="0">
@@ -29418,10 +29861,10 @@
               <a:buChar char="●"/>
             </a:pPr>
             <a:r>
-              <a:rPr lang="es-419"/>
+              <a:rPr lang="es-419" dirty="0"/>
               <a:t>El compilador ignora todos los comentarios.</a:t>
             </a:r>
-            <a:endParaRPr/>
+            <a:endParaRPr dirty="0"/>
           </a:p>
           <a:p>
             <a:pPr marL="457200" lvl="0" indent="-342900" algn="l" rtl="0">
@@ -29435,10 +29878,10 @@
               <a:buChar char="●"/>
             </a:pPr>
             <a:r>
-              <a:rPr lang="es-419"/>
+              <a:rPr lang="es-419" dirty="0"/>
               <a:t>Comentarios de una línea //</a:t>
             </a:r>
-            <a:endParaRPr/>
+            <a:endParaRPr dirty="0"/>
           </a:p>
           <a:p>
             <a:pPr marL="457200" lvl="0" indent="-342900" algn="l" rtl="0">
@@ -29452,10 +29895,10 @@
               <a:buChar char="●"/>
             </a:pPr>
             <a:r>
-              <a:rPr lang="es-419"/>
+              <a:rPr lang="es-419" dirty="0"/>
               <a:t>Bloque de comentarios va entre /*  */</a:t>
             </a:r>
-            <a:endParaRPr/>
+            <a:endParaRPr dirty="0"/>
           </a:p>
         </p:txBody>
       </p:sp>
@@ -29519,10 +29962,10 @@
               <a:buNone/>
             </a:pPr>
             <a:r>
-              <a:rPr lang="es-419"/>
+              <a:rPr lang="es-419" dirty="0"/>
               <a:t>Depuración y tipos de errores</a:t>
             </a:r>
-            <a:endParaRPr/>
+            <a:endParaRPr dirty="0"/>
           </a:p>
         </p:txBody>
       </p:sp>
@@ -29562,10 +30005,10 @@
               <a:buChar char="●"/>
             </a:pPr>
             <a:r>
-              <a:rPr lang="es-419"/>
+              <a:rPr lang="es-419" dirty="0"/>
               <a:t>Rara vez los programas funcionan bien a la primera, y si funcionan bien a la primera revisen 2 veces.</a:t>
             </a:r>
-            <a:endParaRPr/>
+            <a:endParaRPr dirty="0"/>
           </a:p>
           <a:p>
             <a:pPr marL="457200" lvl="0" indent="-342900" algn="l" rtl="0">
@@ -29579,18 +30022,18 @@
               <a:buChar char="●"/>
             </a:pPr>
             <a:r>
-              <a:rPr lang="es-419"/>
+              <a:rPr lang="es-419" dirty="0"/>
               <a:t>Al proceso de encontrar y/o resolver errores se le denomina </a:t>
             </a:r>
             <a:r>
-              <a:rPr lang="es-419" i="1"/>
+              <a:rPr lang="es-419" i="1" dirty="0"/>
               <a:t>depurar</a:t>
             </a:r>
             <a:r>
-              <a:rPr lang="es-419"/>
+              <a:rPr lang="es-419" dirty="0"/>
               <a:t>.</a:t>
             </a:r>
-            <a:endParaRPr/>
+            <a:endParaRPr dirty="0"/>
           </a:p>
           <a:p>
             <a:pPr marL="457200" lvl="0" indent="-342900" algn="l" rtl="0">
@@ -29604,18 +30047,26 @@
               <a:buChar char="●"/>
             </a:pPr>
             <a:r>
-              <a:rPr lang="es-419"/>
+              <a:rPr lang="es-419" dirty="0"/>
               <a:t>Al programa que ayuda a depurar se le llama </a:t>
             </a:r>
             <a:r>
-              <a:rPr lang="es-419" i="1"/>
+              <a:rPr lang="es-419" i="1" dirty="0"/>
               <a:t>depurador</a:t>
             </a:r>
             <a:r>
-              <a:rPr lang="es-419"/>
-              <a:t> (debugger).</a:t>
-            </a:r>
-            <a:endParaRPr/>
+              <a:rPr lang="es-419" dirty="0"/>
+              <a:t> (</a:t>
+            </a:r>
+            <a:r>
+              <a:rPr lang="es-419" dirty="0" err="1"/>
+              <a:t>debugger</a:t>
+            </a:r>
+            <a:r>
+              <a:rPr lang="es-419" dirty="0"/>
+              <a:t>).</a:t>
+            </a:r>
+            <a:endParaRPr dirty="0"/>
           </a:p>
           <a:p>
             <a:pPr marL="457200" lvl="0" indent="-342900" algn="l" rtl="0">
@@ -29629,10 +30080,10 @@
               <a:buChar char="●"/>
             </a:pPr>
             <a:r>
-              <a:rPr lang="es-419"/>
+              <a:rPr lang="es-419" dirty="0"/>
               <a:t>Por tipos de errores podemos mencionar:</a:t>
             </a:r>
-            <a:endParaRPr/>
+            <a:endParaRPr dirty="0"/>
           </a:p>
           <a:p>
             <a:pPr marL="914400" lvl="1" indent="-317500" algn="l" rtl="0">
@@ -29646,10 +30097,10 @@
               <a:buChar char="○"/>
             </a:pPr>
             <a:r>
-              <a:rPr lang="es-419"/>
+              <a:rPr lang="es-419" dirty="0"/>
               <a:t>Errores de sintaxis: son aquellos que se producen cuando el programa viola la sintaxis, es decir, las reglas de gramática del lenguaje.</a:t>
             </a:r>
-            <a:endParaRPr/>
+            <a:endParaRPr dirty="0"/>
           </a:p>
           <a:p>
             <a:pPr marL="914400" lvl="1" indent="-317500" algn="l" rtl="0">
@@ -29663,10 +30114,10 @@
               <a:buChar char="○"/>
             </a:pPr>
             <a:r>
-              <a:rPr lang="es-419"/>
+              <a:rPr lang="es-419" dirty="0"/>
               <a:t>Errores lógicos: representan errores del programador en el diseño del algoritmo</a:t>
             </a:r>
-            <a:endParaRPr/>
+            <a:endParaRPr dirty="0"/>
           </a:p>
           <a:p>
             <a:pPr marL="914400" lvl="1" indent="-317500" algn="l" rtl="0">
@@ -29680,10 +30131,10 @@
               <a:buChar char="○"/>
             </a:pPr>
             <a:r>
-              <a:rPr lang="es-419"/>
+              <a:rPr lang="es-419" dirty="0"/>
               <a:t>Errores en tiempo de ejecución: puede ocurrir cuando el programa trata de realizar una operación ilegal como dividir entre cero, obtener la raíz cuadrada de un número negativo, manipular datos no definidos.</a:t>
             </a:r>
-            <a:endParaRPr/>
+            <a:endParaRPr dirty="0"/>
           </a:p>
         </p:txBody>
       </p:sp>

</xml_diff>